<commit_message>
Throughput graph plots are added.
</commit_message>
<xml_diff>
--- a/draft.pptx
+++ b/draft.pptx
@@ -5,7 +5,7 @@
     <p:sldMasterId id="2147483648" r:id="rId1"/>
   </p:sldMasterIdLst>
   <p:notesMasterIdLst>
-    <p:notesMasterId r:id="rId35"/>
+    <p:notesMasterId r:id="rId37"/>
   </p:notesMasterIdLst>
   <p:sldIdLst>
     <p:sldId id="271" r:id="rId2"/>
@@ -34,13 +34,15 @@
     <p:sldId id="292" r:id="rId25"/>
     <p:sldId id="293" r:id="rId26"/>
     <p:sldId id="308" r:id="rId27"/>
-    <p:sldId id="309" r:id="rId28"/>
-    <p:sldId id="299" r:id="rId29"/>
-    <p:sldId id="310" r:id="rId30"/>
-    <p:sldId id="294" r:id="rId31"/>
-    <p:sldId id="295" r:id="rId32"/>
-    <p:sldId id="305" r:id="rId33"/>
-    <p:sldId id="306" r:id="rId34"/>
+    <p:sldId id="311" r:id="rId28"/>
+    <p:sldId id="312" r:id="rId29"/>
+    <p:sldId id="313" r:id="rId30"/>
+    <p:sldId id="309" r:id="rId31"/>
+    <p:sldId id="310" r:id="rId32"/>
+    <p:sldId id="294" r:id="rId33"/>
+    <p:sldId id="295" r:id="rId34"/>
+    <p:sldId id="305" r:id="rId35"/>
+    <p:sldId id="306" r:id="rId36"/>
   </p:sldIdLst>
   <p:sldSz cx="9144000" cy="6858000" type="screen4x3"/>
   <p:notesSz cx="6858000" cy="9144000"/>
@@ -1289,23 +1291,23 @@
     </dgm:pt>
   </dgm:ptLst>
   <dgm:cxnLst>
+    <dgm:cxn modelId="{BE7C72DE-42E2-4C47-8ACB-447C8E07AA89}" srcId="{AA3CE64F-D819-489B-BAEC-07FD176286AA}" destId="{EEAE959C-8B41-42F0-9C34-86DA2D2322C3}" srcOrd="3" destOrd="0" parTransId="{93C87172-1244-4780-A281-3605DB047D00}" sibTransId="{9305EB60-9E48-4B47-8F9C-A4732A3BDE2E}"/>
+    <dgm:cxn modelId="{C01B5D72-F243-4C7A-A2A4-D304CA50FF34}" type="presOf" srcId="{AA3CE64F-D819-489B-BAEC-07FD176286AA}" destId="{C5D450F5-4A4B-45F5-B81D-8B42E8C47EE8}" srcOrd="0" destOrd="0" presId="urn:microsoft.com/office/officeart/2005/8/layout/radial4"/>
+    <dgm:cxn modelId="{509C6A6A-AD81-4B76-9D4E-35FB9EF75693}" type="presOf" srcId="{B63C605C-6EE4-4006-86B1-7423E4A42AAB}" destId="{8BC262D8-76E4-4907-B14A-660F9BF09A09}" srcOrd="0" destOrd="0" presId="urn:microsoft.com/office/officeart/2005/8/layout/radial4"/>
+    <dgm:cxn modelId="{D0C9E044-F062-495F-9895-534008E0EB9F}" srcId="{AA3CE64F-D819-489B-BAEC-07FD176286AA}" destId="{99ACB726-CEC4-46B6-96D8-7E08646B254D}" srcOrd="0" destOrd="0" parTransId="{0A3DC9CD-B8FF-4806-A756-2EAB23FC78F5}" sibTransId="{8D1E7AD8-7BF4-4844-91D2-0EDE872050B8}"/>
+    <dgm:cxn modelId="{5E6DCB2D-CE80-4EE8-9B46-12D82444E6E2}" type="presOf" srcId="{0A3DC9CD-B8FF-4806-A756-2EAB23FC78F5}" destId="{8C40008D-58B9-46E1-A1EB-A58B4C11D4E0}" srcOrd="0" destOrd="0" presId="urn:microsoft.com/office/officeart/2005/8/layout/radial4"/>
+    <dgm:cxn modelId="{36EF1103-8EFD-4D8B-9D56-D0A706A95B44}" type="presOf" srcId="{93C87172-1244-4780-A281-3605DB047D00}" destId="{95E9FF46-DD33-4EF7-A118-B0B2CD258E8D}" srcOrd="0" destOrd="0" presId="urn:microsoft.com/office/officeart/2005/8/layout/radial4"/>
     <dgm:cxn modelId="{47235DCE-642B-4DE9-89F7-18141223784F}" type="presOf" srcId="{CE2A035D-4416-4A28-9909-4FB4243AF238}" destId="{7EAAD3A5-E457-4B40-9910-A21236FBC020}" srcOrd="0" destOrd="0" presId="urn:microsoft.com/office/officeart/2005/8/layout/radial4"/>
+    <dgm:cxn modelId="{174B6618-7084-49CD-9E1A-A39689428C0B}" type="presOf" srcId="{1B60FA66-C723-4A5E-838D-D864305013A1}" destId="{68F9F1A1-6803-4F1B-8746-C55F9EB8AC61}" srcOrd="0" destOrd="0" presId="urn:microsoft.com/office/officeart/2005/8/layout/radial4"/>
+    <dgm:cxn modelId="{4636C219-692D-4B1B-8E0F-2E213F3BD94D}" type="presOf" srcId="{EEAE959C-8B41-42F0-9C34-86DA2D2322C3}" destId="{FB467A8B-A7C8-4530-96BD-E870AC4E5070}" srcOrd="0" destOrd="0" presId="urn:microsoft.com/office/officeart/2005/8/layout/radial4"/>
+    <dgm:cxn modelId="{E6B25780-D3ED-40F8-9B74-DC68FC79B053}" srcId="{B63C605C-6EE4-4006-86B1-7423E4A42AAB}" destId="{AA3CE64F-D819-489B-BAEC-07FD176286AA}" srcOrd="0" destOrd="0" parTransId="{9C8B5E2E-40E0-4841-B383-4E4975348CAC}" sibTransId="{A9E38521-4FDC-4065-AD88-741E39BA6ACD}"/>
+    <dgm:cxn modelId="{65229995-0585-46FE-A835-4C6EAF14A77E}" type="presOf" srcId="{EC6A4DBA-70C7-44CD-B4BE-9E0062960D1D}" destId="{FA01325E-2A60-46C3-B202-7FE6FC76E583}" srcOrd="0" destOrd="0" presId="urn:microsoft.com/office/officeart/2005/8/layout/radial4"/>
+    <dgm:cxn modelId="{5DC4997E-69CD-4F5B-8667-F74AF5499301}" type="presOf" srcId="{B0E2C893-C694-4CB9-AAD4-F301A33A0D9F}" destId="{3B5905D3-CF2D-4E97-9112-DA1EC00C5319}" srcOrd="0" destOrd="0" presId="urn:microsoft.com/office/officeart/2005/8/layout/radial4"/>
+    <dgm:cxn modelId="{D0737538-94ED-470C-9DA9-D82327BF3CC2}" type="presOf" srcId="{99ACB726-CEC4-46B6-96D8-7E08646B254D}" destId="{6B1B8E19-ABB2-4D79-8B2B-B60A10E613B6}" srcOrd="0" destOrd="0" presId="urn:microsoft.com/office/officeart/2005/8/layout/radial4"/>
+    <dgm:cxn modelId="{CE0D2520-E64D-4AD3-8C7D-839345038FC5}" srcId="{B63C605C-6EE4-4006-86B1-7423E4A42AAB}" destId="{5A9EDD65-DD39-4E93-A885-12252E5DB0AB}" srcOrd="1" destOrd="0" parTransId="{FC2F9543-60B1-4FA5-8810-09573A76B4FD}" sibTransId="{22DF15FB-B743-4570-8C11-490F24B6B12A}"/>
     <dgm:cxn modelId="{754B3736-BCB5-41AD-A7A4-97CD822F13E4}" srcId="{AA3CE64F-D819-489B-BAEC-07FD176286AA}" destId="{1B60FA66-C723-4A5E-838D-D864305013A1}" srcOrd="2" destOrd="0" parTransId="{CE2A035D-4416-4A28-9909-4FB4243AF238}" sibTransId="{3FB9F396-8817-4895-BC35-3FFFA3E01B01}"/>
-    <dgm:cxn modelId="{5E6DCB2D-CE80-4EE8-9B46-12D82444E6E2}" type="presOf" srcId="{0A3DC9CD-B8FF-4806-A756-2EAB23FC78F5}" destId="{8C40008D-58B9-46E1-A1EB-A58B4C11D4E0}" srcOrd="0" destOrd="0" presId="urn:microsoft.com/office/officeart/2005/8/layout/radial4"/>
-    <dgm:cxn modelId="{509C6A6A-AD81-4B76-9D4E-35FB9EF75693}" type="presOf" srcId="{B63C605C-6EE4-4006-86B1-7423E4A42AAB}" destId="{8BC262D8-76E4-4907-B14A-660F9BF09A09}" srcOrd="0" destOrd="0" presId="urn:microsoft.com/office/officeart/2005/8/layout/radial4"/>
-    <dgm:cxn modelId="{E6B25780-D3ED-40F8-9B74-DC68FC79B053}" srcId="{B63C605C-6EE4-4006-86B1-7423E4A42AAB}" destId="{AA3CE64F-D819-489B-BAEC-07FD176286AA}" srcOrd="0" destOrd="0" parTransId="{9C8B5E2E-40E0-4841-B383-4E4975348CAC}" sibTransId="{A9E38521-4FDC-4065-AD88-741E39BA6ACD}"/>
+    <dgm:cxn modelId="{A3430334-65B7-400D-9275-F52D77C3E344}" srcId="{AA3CE64F-D819-489B-BAEC-07FD176286AA}" destId="{B0E2C893-C694-4CB9-AAD4-F301A33A0D9F}" srcOrd="1" destOrd="0" parTransId="{EC6A4DBA-70C7-44CD-B4BE-9E0062960D1D}" sibTransId="{1ABBC383-770A-4CE4-AB1D-E4EB6D07C90F}"/>
     <dgm:cxn modelId="{44A866A1-B624-4E71-9B64-6991B4FA1AB6}" srcId="{B63C605C-6EE4-4006-86B1-7423E4A42AAB}" destId="{87DE4747-4315-404F-B30D-B55E344B6F3E}" srcOrd="2" destOrd="0" parTransId="{447317A3-3A71-4196-A81A-03565559C2D5}" sibTransId="{43640BAD-610E-49EF-B765-C2B2D3C038E5}"/>
-    <dgm:cxn modelId="{4636C219-692D-4B1B-8E0F-2E213F3BD94D}" type="presOf" srcId="{EEAE959C-8B41-42F0-9C34-86DA2D2322C3}" destId="{FB467A8B-A7C8-4530-96BD-E870AC4E5070}" srcOrd="0" destOrd="0" presId="urn:microsoft.com/office/officeart/2005/8/layout/radial4"/>
-    <dgm:cxn modelId="{174B6618-7084-49CD-9E1A-A39689428C0B}" type="presOf" srcId="{1B60FA66-C723-4A5E-838D-D864305013A1}" destId="{68F9F1A1-6803-4F1B-8746-C55F9EB8AC61}" srcOrd="0" destOrd="0" presId="urn:microsoft.com/office/officeart/2005/8/layout/radial4"/>
-    <dgm:cxn modelId="{D0C9E044-F062-495F-9895-534008E0EB9F}" srcId="{AA3CE64F-D819-489B-BAEC-07FD176286AA}" destId="{99ACB726-CEC4-46B6-96D8-7E08646B254D}" srcOrd="0" destOrd="0" parTransId="{0A3DC9CD-B8FF-4806-A756-2EAB23FC78F5}" sibTransId="{8D1E7AD8-7BF4-4844-91D2-0EDE872050B8}"/>
-    <dgm:cxn modelId="{65229995-0585-46FE-A835-4C6EAF14A77E}" type="presOf" srcId="{EC6A4DBA-70C7-44CD-B4BE-9E0062960D1D}" destId="{FA01325E-2A60-46C3-B202-7FE6FC76E583}" srcOrd="0" destOrd="0" presId="urn:microsoft.com/office/officeart/2005/8/layout/radial4"/>
-    <dgm:cxn modelId="{36EF1103-8EFD-4D8B-9D56-D0A706A95B44}" type="presOf" srcId="{93C87172-1244-4780-A281-3605DB047D00}" destId="{95E9FF46-DD33-4EF7-A118-B0B2CD258E8D}" srcOrd="0" destOrd="0" presId="urn:microsoft.com/office/officeart/2005/8/layout/radial4"/>
-    <dgm:cxn modelId="{CE0D2520-E64D-4AD3-8C7D-839345038FC5}" srcId="{B63C605C-6EE4-4006-86B1-7423E4A42AAB}" destId="{5A9EDD65-DD39-4E93-A885-12252E5DB0AB}" srcOrd="1" destOrd="0" parTransId="{FC2F9543-60B1-4FA5-8810-09573A76B4FD}" sibTransId="{22DF15FB-B743-4570-8C11-490F24B6B12A}"/>
-    <dgm:cxn modelId="{C01B5D72-F243-4C7A-A2A4-D304CA50FF34}" type="presOf" srcId="{AA3CE64F-D819-489B-BAEC-07FD176286AA}" destId="{C5D450F5-4A4B-45F5-B81D-8B42E8C47EE8}" srcOrd="0" destOrd="0" presId="urn:microsoft.com/office/officeart/2005/8/layout/radial4"/>
-    <dgm:cxn modelId="{5DC4997E-69CD-4F5B-8667-F74AF5499301}" type="presOf" srcId="{B0E2C893-C694-4CB9-AAD4-F301A33A0D9F}" destId="{3B5905D3-CF2D-4E97-9112-DA1EC00C5319}" srcOrd="0" destOrd="0" presId="urn:microsoft.com/office/officeart/2005/8/layout/radial4"/>
-    <dgm:cxn modelId="{A3430334-65B7-400D-9275-F52D77C3E344}" srcId="{AA3CE64F-D819-489B-BAEC-07FD176286AA}" destId="{B0E2C893-C694-4CB9-AAD4-F301A33A0D9F}" srcOrd="1" destOrd="0" parTransId="{EC6A4DBA-70C7-44CD-B4BE-9E0062960D1D}" sibTransId="{1ABBC383-770A-4CE4-AB1D-E4EB6D07C90F}"/>
-    <dgm:cxn modelId="{BE7C72DE-42E2-4C47-8ACB-447C8E07AA89}" srcId="{AA3CE64F-D819-489B-BAEC-07FD176286AA}" destId="{EEAE959C-8B41-42F0-9C34-86DA2D2322C3}" srcOrd="3" destOrd="0" parTransId="{93C87172-1244-4780-A281-3605DB047D00}" sibTransId="{9305EB60-9E48-4B47-8F9C-A4732A3BDE2E}"/>
-    <dgm:cxn modelId="{D0737538-94ED-470C-9DA9-D82327BF3CC2}" type="presOf" srcId="{99ACB726-CEC4-46B6-96D8-7E08646B254D}" destId="{6B1B8E19-ABB2-4D79-8B2B-B60A10E613B6}" srcOrd="0" destOrd="0" presId="urn:microsoft.com/office/officeart/2005/8/layout/radial4"/>
     <dgm:cxn modelId="{49944CBB-D577-4B02-929C-8F86C6807B76}" type="presParOf" srcId="{8BC262D8-76E4-4907-B14A-660F9BF09A09}" destId="{C5D450F5-4A4B-45F5-B81D-8B42E8C47EE8}" srcOrd="0" destOrd="0" presId="urn:microsoft.com/office/officeart/2005/8/layout/radial4"/>
     <dgm:cxn modelId="{78064F9F-7EEE-4F61-BC20-DF3A892EC55C}" type="presParOf" srcId="{8BC262D8-76E4-4907-B14A-660F9BF09A09}" destId="{8C40008D-58B9-46E1-A1EB-A58B4C11D4E0}" srcOrd="1" destOrd="0" presId="urn:microsoft.com/office/officeart/2005/8/layout/radial4"/>
     <dgm:cxn modelId="{5B18FC7A-178A-46D2-903D-BCF729619A1D}" type="presParOf" srcId="{8BC262D8-76E4-4907-B14A-660F9BF09A09}" destId="{6B1B8E19-ABB2-4D79-8B2B-B60A10E613B6}" srcOrd="2" destOrd="0" presId="urn:microsoft.com/office/officeart/2005/8/layout/radial4"/>
@@ -3288,7 +3290,7 @@
             <a:fld id="{E549EE46-AC67-4C28-AC2A-E0B964C90DEF}" type="datetimeFigureOut">
               <a:rPr lang="en-US" smtClean="0"/>
               <a:pPr/>
-              <a:t>7/3/2017</a:t>
+              <a:t>7/15/2017</a:t>
             </a:fld>
             <a:endParaRPr lang="en-US"/>
           </a:p>
@@ -3741,7 +3743,7 @@
             <a:fld id="{9792B235-0C5A-47B9-BBB5-A42D877B9FB0}" type="datetime1">
               <a:rPr lang="en-US" smtClean="0"/>
               <a:pPr/>
-              <a:t>7/3/2017</a:t>
+              <a:t>7/15/2017</a:t>
             </a:fld>
             <a:endParaRPr lang="en-US" dirty="0"/>
           </a:p>
@@ -3908,7 +3910,7 @@
             <a:fld id="{A944F276-36ED-4FB2-B362-5FAF0600629E}" type="datetime1">
               <a:rPr lang="en-US" smtClean="0"/>
               <a:pPr/>
-              <a:t>7/3/2017</a:t>
+              <a:t>7/15/2017</a:t>
             </a:fld>
             <a:endParaRPr lang="en-US" dirty="0"/>
           </a:p>
@@ -4085,7 +4087,7 @@
             <a:fld id="{4A45260D-7141-4579-81D9-38647F11C8ED}" type="datetime1">
               <a:rPr lang="en-US" smtClean="0"/>
               <a:pPr/>
-              <a:t>7/3/2017</a:t>
+              <a:t>7/15/2017</a:t>
             </a:fld>
             <a:endParaRPr lang="en-US" dirty="0"/>
           </a:p>
@@ -4252,7 +4254,7 @@
             <a:fld id="{385156CA-7574-440A-96D4-4102C3AA539C}" type="datetime1">
               <a:rPr lang="en-US" smtClean="0"/>
               <a:pPr/>
-              <a:t>7/3/2017</a:t>
+              <a:t>7/15/2017</a:t>
             </a:fld>
             <a:endParaRPr lang="en-US" dirty="0"/>
           </a:p>
@@ -4495,7 +4497,7 @@
             <a:fld id="{F3E31599-7C06-4D29-B089-B003833940BF}" type="datetime1">
               <a:rPr lang="en-US" smtClean="0"/>
               <a:pPr/>
-              <a:t>7/3/2017</a:t>
+              <a:t>7/15/2017</a:t>
             </a:fld>
             <a:endParaRPr lang="en-US" dirty="0"/>
           </a:p>
@@ -4780,7 +4782,7 @@
             <a:fld id="{95ABA74C-1295-4FA9-A237-F76B19BCC0F0}" type="datetime1">
               <a:rPr lang="en-US" smtClean="0"/>
               <a:pPr/>
-              <a:t>7/3/2017</a:t>
+              <a:t>7/15/2017</a:t>
             </a:fld>
             <a:endParaRPr lang="en-US" dirty="0"/>
           </a:p>
@@ -5199,7 +5201,7 @@
             <a:fld id="{0DAD9372-E8ED-4F72-8BE3-61F604274E26}" type="datetime1">
               <a:rPr lang="en-US" smtClean="0"/>
               <a:pPr/>
-              <a:t>7/3/2017</a:t>
+              <a:t>7/15/2017</a:t>
             </a:fld>
             <a:endParaRPr lang="en-US" dirty="0"/>
           </a:p>
@@ -5314,7 +5316,7 @@
             <a:fld id="{F3743E68-D890-48B6-A470-753584C71019}" type="datetime1">
               <a:rPr lang="en-US" smtClean="0"/>
               <a:pPr/>
-              <a:t>7/3/2017</a:t>
+              <a:t>7/15/2017</a:t>
             </a:fld>
             <a:endParaRPr lang="en-US" dirty="0"/>
           </a:p>
@@ -5406,7 +5408,7 @@
             <a:fld id="{341DF95D-C75E-4DDC-8CBD-DED4995C2915}" type="datetime1">
               <a:rPr lang="en-US" smtClean="0"/>
               <a:pPr/>
-              <a:t>7/3/2017</a:t>
+              <a:t>7/15/2017</a:t>
             </a:fld>
             <a:endParaRPr lang="en-US" dirty="0"/>
           </a:p>
@@ -5680,7 +5682,7 @@
             <a:fld id="{A562B837-FD09-41E7-B872-3E7389785772}" type="datetime1">
               <a:rPr lang="en-US" smtClean="0"/>
               <a:pPr/>
-              <a:t>7/3/2017</a:t>
+              <a:t>7/15/2017</a:t>
             </a:fld>
             <a:endParaRPr lang="en-US" dirty="0"/>
           </a:p>
@@ -5930,7 +5932,7 @@
             <a:fld id="{00876762-A287-4D66-B1A5-F2423B02207F}" type="datetime1">
               <a:rPr lang="en-US" smtClean="0"/>
               <a:pPr/>
-              <a:t>7/3/2017</a:t>
+              <a:t>7/15/2017</a:t>
             </a:fld>
             <a:endParaRPr lang="en-US" dirty="0"/>
           </a:p>
@@ -6140,7 +6142,7 @@
             <a:fld id="{A3CA299C-6881-4927-8BDA-7E40CF18A5F4}" type="datetime1">
               <a:rPr lang="en-US" smtClean="0"/>
               <a:pPr/>
-              <a:t>7/3/2017</a:t>
+              <a:t>7/15/2017</a:t>
             </a:fld>
             <a:endParaRPr lang="en-US" dirty="0"/>
           </a:p>
@@ -6560,7 +6562,7 @@
         </p:spPr>
         <p:txBody>
           <a:bodyPr>
-            <a:normAutofit fontScale="92500" lnSpcReduction="10000"/>
+            <a:noAutofit/>
           </a:bodyPr>
           <a:lstStyle/>
           <a:p>
@@ -6570,14 +6572,9 @@
               </a:lnSpc>
             </a:pPr>
             <a:r>
-              <a:rPr lang="en-US" sz="2000" dirty="0" smtClean="0"/>
-              <a:t>M.Sc. </a:t>
-            </a:r>
-            <a:r>
-              <a:rPr lang="en-US" sz="2000" dirty="0" smtClean="0"/>
-              <a:t>Thesis</a:t>
-            </a:r>
-            <a:endParaRPr lang="en-US" sz="2000" dirty="0" smtClean="0"/>
+              <a:rPr lang="en-US" sz="2200" dirty="0" smtClean="0"/>
+              <a:t>M.Sc. Thesis</a:t>
+            </a:r>
           </a:p>
           <a:p>
             <a:pPr>
@@ -6586,7 +6583,7 @@
               </a:lnSpc>
             </a:pPr>
             <a:r>
-              <a:rPr lang="en-US" sz="2000" dirty="0" smtClean="0"/>
+              <a:rPr lang="en-US" sz="2200" dirty="0" smtClean="0"/>
               <a:t>by</a:t>
             </a:r>
           </a:p>
@@ -6597,7 +6594,7 @@
               </a:lnSpc>
             </a:pPr>
             <a:r>
-              <a:rPr lang="en-US" dirty="0" smtClean="0">
+              <a:rPr lang="en-US" sz="2400" dirty="0" smtClean="0">
                 <a:solidFill>
                   <a:schemeClr val="tx1"/>
                 </a:solidFill>
@@ -6612,10 +6609,10 @@
               </a:lnSpc>
             </a:pPr>
             <a:r>
-              <a:rPr lang="en-US" sz="2400" dirty="0" smtClean="0"/>
+              <a:rPr lang="en-US" sz="2200" dirty="0" smtClean="0"/>
               <a:t>Student ID: 1014052013</a:t>
             </a:r>
-            <a:endParaRPr lang="en-US" sz="2400" dirty="0"/>
+            <a:endParaRPr lang="en-US" sz="2200" dirty="0"/>
           </a:p>
         </p:txBody>
       </p:sp>
@@ -6657,7 +6654,7 @@
               <a:defRPr/>
             </a:pPr>
             <a:r>
-              <a:rPr lang="en-US" sz="2000" dirty="0" smtClean="0">
+              <a:rPr lang="en-US" dirty="0" smtClean="0">
                 <a:solidFill>
                   <a:schemeClr val="tx1">
                     <a:tint val="75000"/>
@@ -6667,7 +6664,7 @@
               <a:t>Supervised </a:t>
             </a:r>
             <a:r>
-              <a:rPr kumimoji="0" lang="en-US" sz="2000" b="0" i="0" u="none" strike="noStrike" kern="1200" cap="none" spc="0" normalizeH="0" baseline="0" noProof="0" dirty="0" smtClean="0">
+              <a:rPr kumimoji="0" lang="en-US" b="0" i="0" u="none" strike="noStrike" kern="1200" cap="none" spc="0" normalizeH="0" baseline="0" noProof="0" dirty="0" smtClean="0">
                 <a:ln>
                   <a:noFill/>
                 </a:ln>
@@ -6679,9 +6676,6 @@
                 <a:effectLst/>
                 <a:uLnTx/>
                 <a:uFillTx/>
-                <a:latin typeface="+mn-lt"/>
-                <a:ea typeface="+mn-ea"/>
-                <a:cs typeface="+mn-cs"/>
               </a:rPr>
               <a:t>by:</a:t>
             </a:r>
@@ -6693,35 +6687,32 @@
               </a:spcBef>
             </a:pPr>
             <a:r>
-              <a:rPr lang="es-ES" sz="2600" dirty="0" smtClean="0"/>
+              <a:rPr lang="es-ES" sz="2000" dirty="0" smtClean="0"/>
               <a:t>A. B. M. Alim Al Islam, </a:t>
             </a:r>
             <a:r>
-              <a:rPr lang="es-ES" sz="2600" dirty="0" err="1" smtClean="0"/>
+              <a:rPr lang="es-ES" sz="2000" dirty="0" err="1" smtClean="0"/>
               <a:t>Associate</a:t>
             </a:r>
             <a:r>
-              <a:rPr lang="es-ES" sz="2600" dirty="0" smtClean="0"/>
+              <a:rPr lang="es-ES" sz="2000" dirty="0" smtClean="0"/>
               <a:t> </a:t>
             </a:r>
             <a:r>
-              <a:rPr lang="en-US" sz="2600" dirty="0" smtClean="0"/>
+              <a:rPr lang="en-US" sz="2000" dirty="0" smtClean="0"/>
               <a:t>Professor</a:t>
             </a:r>
             <a:r>
-              <a:rPr lang="es-ES" sz="2600" dirty="0" smtClean="0"/>
+              <a:rPr lang="es-ES" sz="2000" dirty="0" smtClean="0"/>
               <a:t>.</a:t>
             </a:r>
-            <a:endParaRPr kumimoji="0" lang="en-US" sz="2600" i="0" u="none" strike="noStrike" kern="1200" cap="none" spc="0" normalizeH="0" baseline="0" noProof="0" dirty="0">
+            <a:endParaRPr kumimoji="0" lang="en-US" sz="2000" i="0" u="none" strike="noStrike" kern="1200" cap="none" spc="0" normalizeH="0" baseline="0" noProof="0" dirty="0">
               <a:ln>
                 <a:noFill/>
               </a:ln>
               <a:effectLst/>
               <a:uLnTx/>
               <a:uFillTx/>
-              <a:latin typeface="+mn-lt"/>
-              <a:ea typeface="+mn-ea"/>
-              <a:cs typeface="+mn-cs"/>
             </a:endParaRPr>
           </a:p>
         </p:txBody>
@@ -6759,7 +6750,7 @@
         <p:spPr>
           <a:xfrm>
             <a:off x="2286000" y="6015335"/>
-            <a:ext cx="4572000" cy="461665"/>
+            <a:ext cx="4572000" cy="430887"/>
           </a:xfrm>
           <a:prstGeom prst="rect">
             <a:avLst/>
@@ -6774,10 +6765,10 @@
           <a:p>
             <a:pPr algn="ctr"/>
             <a:r>
-              <a:rPr lang="en-US" sz="2400" dirty="0" smtClean="0"/>
+              <a:rPr lang="en-US" sz="2200" dirty="0" smtClean="0"/>
               <a:t>Dept. of CSE, BUET.</a:t>
             </a:r>
-            <a:endParaRPr lang="en-US" sz="2400" dirty="0"/>
+            <a:endParaRPr lang="en-US" sz="2200" dirty="0"/>
           </a:p>
         </p:txBody>
       </p:sp>
@@ -9439,22 +9430,28 @@
       </p:sp>
       <p:pic>
         <p:nvPicPr>
-          <p:cNvPr id="4" name="Picture 3" descr="SpectrumUnderutilization.jpg"/>
+          <p:cNvPr id="4" name="Picture 3"/>
           <p:cNvPicPr>
             <a:picLocks noChangeAspect="1"/>
           </p:cNvPicPr>
           <p:nvPr/>
         </p:nvPicPr>
         <p:blipFill>
-          <a:blip r:embed="rId2"/>
+          <a:blip r:embed="rId2">
+            <a:extLst>
+              <a:ext uri="{28A0092B-C50C-407E-A947-70E740481C1C}">
+                <a14:useLocalDpi xmlns:a14="http://schemas.microsoft.com/office/drawing/2010/main" val="0"/>
+              </a:ext>
+            </a:extLst>
+          </a:blip>
           <a:stretch>
             <a:fillRect/>
           </a:stretch>
         </p:blipFill>
         <p:spPr>
           <a:xfrm>
-            <a:off x="0" y="2721912"/>
-            <a:ext cx="9144000" cy="3907488"/>
+            <a:off x="7144" y="2721912"/>
+            <a:ext cx="9129712" cy="3907488"/>
           </a:xfrm>
           <a:prstGeom prst="rect">
             <a:avLst/>
@@ -20226,7 +20223,7 @@
           <a:p>
             <a:r>
               <a:rPr lang="en-US" dirty="0" smtClean="0"/>
-              <a:t>Results Obtained So Far</a:t>
+              <a:t>Results Obtained So Far [contd.]</a:t>
             </a:r>
             <a:endParaRPr lang="en-US" dirty="0"/>
           </a:p>
@@ -20251,6 +20248,13 @@
               <a:rPr lang="en-US" dirty="0" smtClean="0"/>
               <a:t>Constant throughput degradation is no longer present</a:t>
             </a:r>
+          </a:p>
+          <a:p>
+            <a:pPr lvl="1"/>
+            <a:r>
+              <a:rPr lang="en-US" dirty="0" smtClean="0"/>
+              <a:t>delay is almost constant </a:t>
+            </a:r>
             <a:endParaRPr lang="en-US" dirty="0"/>
           </a:p>
         </p:txBody>
@@ -20274,6 +20278,1901 @@
               <a:rPr lang="en-US" smtClean="0"/>
               <a:pPr/>
               <a:t>27</a:t>
+            </a:fld>
+            <a:endParaRPr lang="en-US" dirty="0"/>
+          </a:p>
+        </p:txBody>
+      </p:sp>
+      <p:pic>
+        <p:nvPicPr>
+          <p:cNvPr id="4098" name="Picture 2"/>
+          <p:cNvPicPr>
+            <a:picLocks noChangeAspect="1" noChangeArrowheads="1"/>
+          </p:cNvPicPr>
+          <p:nvPr/>
+        </p:nvPicPr>
+        <p:blipFill>
+          <a:blip r:embed="rId2">
+            <a:extLst>
+              <a:ext uri="{28A0092B-C50C-407E-A947-70E740481C1C}">
+                <a14:useLocalDpi xmlns:a14="http://schemas.microsoft.com/office/drawing/2010/main" val="0"/>
+              </a:ext>
+            </a:extLst>
+          </a:blip>
+          <a:srcRect/>
+          <a:stretch>
+            <a:fillRect/>
+          </a:stretch>
+        </p:blipFill>
+        <p:spPr bwMode="auto">
+          <a:xfrm>
+            <a:off x="264181" y="3165764"/>
+            <a:ext cx="8651219" cy="3463636"/>
+          </a:xfrm>
+          <a:prstGeom prst="rect">
+            <a:avLst/>
+          </a:prstGeom>
+          <a:noFill/>
+          <a:ln>
+            <a:noFill/>
+          </a:ln>
+          <a:effectLst/>
+          <a:extLst>
+            <a:ext uri="{909E8E84-426E-40DD-AFC4-6F175D3DCCD1}">
+              <a14:hiddenFill xmlns:a14="http://schemas.microsoft.com/office/drawing/2010/main">
+                <a:solidFill>
+                  <a:schemeClr val="accent1"/>
+                </a:solidFill>
+              </a14:hiddenFill>
+            </a:ext>
+            <a:ext uri="{91240B29-F687-4F45-9708-019B960494DF}">
+              <a14:hiddenLine xmlns:a14="http://schemas.microsoft.com/office/drawing/2010/main" w="9525">
+                <a:solidFill>
+                  <a:schemeClr val="tx1"/>
+                </a:solidFill>
+                <a:miter lim="800000"/>
+                <a:headEnd/>
+                <a:tailEnd/>
+              </a14:hiddenLine>
+            </a:ext>
+            <a:ext uri="{AF507438-7753-43E0-B8FC-AC1667EBCBE1}">
+              <a14:hiddenEffects xmlns:a14="http://schemas.microsoft.com/office/drawing/2010/main">
+                <a:effectLst>
+                  <a:outerShdw dist="35921" dir="2700000" algn="ctr" rotWithShape="0">
+                    <a:schemeClr val="bg2"/>
+                  </a:outerShdw>
+                </a:effectLst>
+              </a14:hiddenEffects>
+            </a:ext>
+          </a:extLst>
+        </p:spPr>
+      </p:pic>
+      <p:cxnSp>
+        <p:nvCxnSpPr>
+          <p:cNvPr id="8" name="Straight Arrow Connector 7"/>
+          <p:cNvCxnSpPr/>
+          <p:nvPr/>
+        </p:nvCxnSpPr>
+        <p:spPr>
+          <a:xfrm flipV="1">
+            <a:off x="1752600" y="5676900"/>
+            <a:ext cx="6858000" cy="114300"/>
+          </a:xfrm>
+          <a:prstGeom prst="straightConnector1">
+            <a:avLst/>
+          </a:prstGeom>
+          <a:ln w="152400">
+            <a:solidFill>
+              <a:schemeClr val="accent2">
+                <a:lumMod val="75000"/>
+              </a:schemeClr>
+            </a:solidFill>
+            <a:tailEnd type="triangle"/>
+          </a:ln>
+        </p:spPr>
+        <p:style>
+          <a:lnRef idx="1">
+            <a:schemeClr val="accent1"/>
+          </a:lnRef>
+          <a:fillRef idx="0">
+            <a:schemeClr val="accent1"/>
+          </a:fillRef>
+          <a:effectRef idx="0">
+            <a:schemeClr val="accent1"/>
+          </a:effectRef>
+          <a:fontRef idx="minor">
+            <a:schemeClr val="tx1"/>
+          </a:fontRef>
+        </p:style>
+      </p:cxnSp>
+    </p:spTree>
+    <p:extLst>
+      <p:ext uri="{BB962C8B-B14F-4D97-AF65-F5344CB8AC3E}">
+        <p14:creationId xmlns:p14="http://schemas.microsoft.com/office/powerpoint/2010/main" val="1024918520"/>
+      </p:ext>
+    </p:extLst>
+  </p:cSld>
+  <p:clrMapOvr>
+    <a:masterClrMapping/>
+  </p:clrMapOvr>
+  <p:timing>
+    <p:tnLst>
+      <p:par>
+        <p:cTn id="1" dur="indefinite" restart="never" nodeType="tmRoot">
+          <p:childTnLst>
+            <p:seq concurrent="1" nextAc="seek">
+              <p:cTn id="2" dur="indefinite" nodeType="mainSeq">
+                <p:childTnLst>
+                  <p:par>
+                    <p:cTn id="3" fill="hold">
+                      <p:stCondLst>
+                        <p:cond delay="indefinite"/>
+                      </p:stCondLst>
+                      <p:childTnLst>
+                        <p:par>
+                          <p:cTn id="4" fill="hold">
+                            <p:stCondLst>
+                              <p:cond delay="0"/>
+                            </p:stCondLst>
+                            <p:childTnLst>
+                              <p:par>
+                                <p:cTn id="5" presetID="22" presetClass="entr" presetSubtype="8" fill="hold" nodeType="clickEffect">
+                                  <p:stCondLst>
+                                    <p:cond delay="0"/>
+                                  </p:stCondLst>
+                                  <p:childTnLst>
+                                    <p:set>
+                                      <p:cBhvr>
+                                        <p:cTn id="6" dur="1" fill="hold">
+                                          <p:stCondLst>
+                                            <p:cond delay="0"/>
+                                          </p:stCondLst>
+                                        </p:cTn>
+                                        <p:tgtEl>
+                                          <p:spTgt spid="8"/>
+                                        </p:tgtEl>
+                                        <p:attrNameLst>
+                                          <p:attrName>style.visibility</p:attrName>
+                                        </p:attrNameLst>
+                                      </p:cBhvr>
+                                      <p:to>
+                                        <p:strVal val="visible"/>
+                                      </p:to>
+                                    </p:set>
+                                    <p:animEffect transition="in" filter="wipe(left)">
+                                      <p:cBhvr>
+                                        <p:cTn id="7" dur="500"/>
+                                        <p:tgtEl>
+                                          <p:spTgt spid="8"/>
+                                        </p:tgtEl>
+                                      </p:cBhvr>
+                                    </p:animEffect>
+                                  </p:childTnLst>
+                                </p:cTn>
+                              </p:par>
+                            </p:childTnLst>
+                          </p:cTn>
+                        </p:par>
+                      </p:childTnLst>
+                    </p:cTn>
+                  </p:par>
+                </p:childTnLst>
+              </p:cTn>
+              <p:prevCondLst>
+                <p:cond evt="onPrev" delay="0">
+                  <p:tgtEl>
+                    <p:sldTgt/>
+                  </p:tgtEl>
+                </p:cond>
+              </p:prevCondLst>
+              <p:nextCondLst>
+                <p:cond evt="onNext" delay="0">
+                  <p:tgtEl>
+                    <p:sldTgt/>
+                  </p:tgtEl>
+                </p:cond>
+              </p:nextCondLst>
+            </p:seq>
+          </p:childTnLst>
+        </p:cTn>
+      </p:par>
+    </p:tnLst>
+  </p:timing>
+</p:sld>
+</file>
+
+<file path=ppt/slides/slide28.xml><?xml version="1.0" encoding="utf-8"?>
+<p:sld xmlns:a="http://schemas.openxmlformats.org/drawingml/2006/main" xmlns:r="http://schemas.openxmlformats.org/officeDocument/2006/relationships" xmlns:p="http://schemas.openxmlformats.org/presentationml/2006/main">
+  <p:cSld>
+    <p:spTree>
+      <p:nvGrpSpPr>
+        <p:cNvPr id="1" name=""/>
+        <p:cNvGrpSpPr/>
+        <p:nvPr/>
+      </p:nvGrpSpPr>
+      <p:grpSpPr>
+        <a:xfrm>
+          <a:off x="0" y="0"/>
+          <a:ext cx="0" cy="0"/>
+          <a:chOff x="0" y="0"/>
+          <a:chExt cx="0" cy="0"/>
+        </a:xfrm>
+      </p:grpSpPr>
+      <p:sp>
+        <p:nvSpPr>
+          <p:cNvPr id="2" name="Slide Number Placeholder 1"/>
+          <p:cNvSpPr>
+            <a:spLocks noGrp="1"/>
+          </p:cNvSpPr>
+          <p:nvPr>
+            <p:ph type="sldNum" sz="quarter" idx="12"/>
+          </p:nvPr>
+        </p:nvSpPr>
+        <p:spPr>
+          <a:xfrm>
+            <a:off x="6553200" y="6492875"/>
+            <a:ext cx="2133600" cy="365125"/>
+          </a:xfrm>
+        </p:spPr>
+        <p:txBody>
+          <a:bodyPr/>
+          <a:lstStyle/>
+          <a:p>
+            <a:fld id="{CF142645-850A-43A6-BF6E-75FA772F8DCF}" type="slidenum">
+              <a:rPr lang="en-US" smtClean="0"/>
+              <a:pPr/>
+              <a:t>28</a:t>
+            </a:fld>
+            <a:endParaRPr lang="en-US" dirty="0"/>
+          </a:p>
+        </p:txBody>
+      </p:sp>
+      <p:pic>
+        <p:nvPicPr>
+          <p:cNvPr id="1030" name="Picture 6"/>
+          <p:cNvPicPr>
+            <a:picLocks noChangeAspect="1" noChangeArrowheads="1"/>
+          </p:cNvPicPr>
+          <p:nvPr/>
+        </p:nvPicPr>
+        <p:blipFill>
+          <a:blip r:embed="rId2" cstate="print">
+            <a:extLst>
+              <a:ext uri="{28A0092B-C50C-407E-A947-70E740481C1C}">
+                <a14:useLocalDpi xmlns:a14="http://schemas.microsoft.com/office/drawing/2010/main" val="0"/>
+              </a:ext>
+            </a:extLst>
+          </a:blip>
+          <a:srcRect/>
+          <a:stretch>
+            <a:fillRect/>
+          </a:stretch>
+        </p:blipFill>
+        <p:spPr bwMode="auto">
+          <a:xfrm>
+            <a:off x="76200" y="325269"/>
+            <a:ext cx="4385603" cy="1933386"/>
+          </a:xfrm>
+          <a:prstGeom prst="rect">
+            <a:avLst/>
+          </a:prstGeom>
+          <a:noFill/>
+          <a:ln>
+            <a:noFill/>
+          </a:ln>
+          <a:effectLst/>
+          <a:extLst>
+            <a:ext uri="{909E8E84-426E-40DD-AFC4-6F175D3DCCD1}">
+              <a14:hiddenFill xmlns:a14="http://schemas.microsoft.com/office/drawing/2010/main">
+                <a:solidFill>
+                  <a:schemeClr val="accent1"/>
+                </a:solidFill>
+              </a14:hiddenFill>
+            </a:ext>
+            <a:ext uri="{91240B29-F687-4F45-9708-019B960494DF}">
+              <a14:hiddenLine xmlns:a14="http://schemas.microsoft.com/office/drawing/2010/main" w="9525">
+                <a:solidFill>
+                  <a:schemeClr val="tx1"/>
+                </a:solidFill>
+                <a:miter lim="800000"/>
+                <a:headEnd/>
+                <a:tailEnd/>
+              </a14:hiddenLine>
+            </a:ext>
+            <a:ext uri="{AF507438-7753-43E0-B8FC-AC1667EBCBE1}">
+              <a14:hiddenEffects xmlns:a14="http://schemas.microsoft.com/office/drawing/2010/main">
+                <a:effectLst>
+                  <a:outerShdw dist="35921" dir="2700000" algn="ctr" rotWithShape="0">
+                    <a:schemeClr val="bg2"/>
+                  </a:outerShdw>
+                </a:effectLst>
+              </a14:hiddenEffects>
+            </a:ext>
+          </a:extLst>
+        </p:spPr>
+      </p:pic>
+      <p:pic>
+        <p:nvPicPr>
+          <p:cNvPr id="1031" name="Picture 7"/>
+          <p:cNvPicPr>
+            <a:picLocks noChangeAspect="1" noChangeArrowheads="1"/>
+          </p:cNvPicPr>
+          <p:nvPr/>
+        </p:nvPicPr>
+        <p:blipFill>
+          <a:blip r:embed="rId3" cstate="print">
+            <a:extLst>
+              <a:ext uri="{28A0092B-C50C-407E-A947-70E740481C1C}">
+                <a14:useLocalDpi xmlns:a14="http://schemas.microsoft.com/office/drawing/2010/main" val="0"/>
+              </a:ext>
+            </a:extLst>
+          </a:blip>
+          <a:srcRect/>
+          <a:stretch>
+            <a:fillRect/>
+          </a:stretch>
+        </p:blipFill>
+        <p:spPr bwMode="auto">
+          <a:xfrm>
+            <a:off x="4648200" y="325268"/>
+            <a:ext cx="4385603" cy="1933386"/>
+          </a:xfrm>
+          <a:prstGeom prst="rect">
+            <a:avLst/>
+          </a:prstGeom>
+          <a:noFill/>
+          <a:ln>
+            <a:noFill/>
+          </a:ln>
+          <a:effectLst/>
+          <a:extLst>
+            <a:ext uri="{909E8E84-426E-40DD-AFC4-6F175D3DCCD1}">
+              <a14:hiddenFill xmlns:a14="http://schemas.microsoft.com/office/drawing/2010/main">
+                <a:solidFill>
+                  <a:schemeClr val="accent1"/>
+                </a:solidFill>
+              </a14:hiddenFill>
+            </a:ext>
+            <a:ext uri="{91240B29-F687-4F45-9708-019B960494DF}">
+              <a14:hiddenLine xmlns:a14="http://schemas.microsoft.com/office/drawing/2010/main" w="9525">
+                <a:solidFill>
+                  <a:schemeClr val="tx1"/>
+                </a:solidFill>
+                <a:miter lim="800000"/>
+                <a:headEnd/>
+                <a:tailEnd/>
+              </a14:hiddenLine>
+            </a:ext>
+            <a:ext uri="{AF507438-7753-43E0-B8FC-AC1667EBCBE1}">
+              <a14:hiddenEffects xmlns:a14="http://schemas.microsoft.com/office/drawing/2010/main">
+                <a:effectLst>
+                  <a:outerShdw dist="35921" dir="2700000" algn="ctr" rotWithShape="0">
+                    <a:schemeClr val="bg2"/>
+                  </a:outerShdw>
+                </a:effectLst>
+              </a14:hiddenEffects>
+            </a:ext>
+          </a:extLst>
+        </p:spPr>
+      </p:pic>
+      <p:pic>
+        <p:nvPicPr>
+          <p:cNvPr id="1033" name="Picture 9"/>
+          <p:cNvPicPr>
+            <a:picLocks noChangeAspect="1" noChangeArrowheads="1"/>
+          </p:cNvPicPr>
+          <p:nvPr/>
+        </p:nvPicPr>
+        <p:blipFill>
+          <a:blip r:embed="rId4" cstate="print">
+            <a:extLst>
+              <a:ext uri="{28A0092B-C50C-407E-A947-70E740481C1C}">
+                <a14:useLocalDpi xmlns:a14="http://schemas.microsoft.com/office/drawing/2010/main" val="0"/>
+              </a:ext>
+            </a:extLst>
+          </a:blip>
+          <a:srcRect/>
+          <a:stretch>
+            <a:fillRect/>
+          </a:stretch>
+        </p:blipFill>
+        <p:spPr bwMode="auto">
+          <a:xfrm>
+            <a:off x="82901" y="2464688"/>
+            <a:ext cx="4385603" cy="1933386"/>
+          </a:xfrm>
+          <a:prstGeom prst="rect">
+            <a:avLst/>
+          </a:prstGeom>
+          <a:noFill/>
+          <a:ln>
+            <a:noFill/>
+          </a:ln>
+          <a:effectLst/>
+          <a:extLst>
+            <a:ext uri="{909E8E84-426E-40DD-AFC4-6F175D3DCCD1}">
+              <a14:hiddenFill xmlns:a14="http://schemas.microsoft.com/office/drawing/2010/main">
+                <a:solidFill>
+                  <a:schemeClr val="accent1"/>
+                </a:solidFill>
+              </a14:hiddenFill>
+            </a:ext>
+            <a:ext uri="{91240B29-F687-4F45-9708-019B960494DF}">
+              <a14:hiddenLine xmlns:a14="http://schemas.microsoft.com/office/drawing/2010/main" w="9525">
+                <a:solidFill>
+                  <a:schemeClr val="tx1"/>
+                </a:solidFill>
+                <a:miter lim="800000"/>
+                <a:headEnd/>
+                <a:tailEnd/>
+              </a14:hiddenLine>
+            </a:ext>
+            <a:ext uri="{AF507438-7753-43E0-B8FC-AC1667EBCBE1}">
+              <a14:hiddenEffects xmlns:a14="http://schemas.microsoft.com/office/drawing/2010/main">
+                <a:effectLst>
+                  <a:outerShdw dist="35921" dir="2700000" algn="ctr" rotWithShape="0">
+                    <a:schemeClr val="bg2"/>
+                  </a:outerShdw>
+                </a:effectLst>
+              </a14:hiddenEffects>
+            </a:ext>
+          </a:extLst>
+        </p:spPr>
+      </p:pic>
+      <p:pic>
+        <p:nvPicPr>
+          <p:cNvPr id="1034" name="Picture 10"/>
+          <p:cNvPicPr>
+            <a:picLocks noChangeAspect="1" noChangeArrowheads="1"/>
+          </p:cNvPicPr>
+          <p:nvPr/>
+        </p:nvPicPr>
+        <p:blipFill>
+          <a:blip r:embed="rId5" cstate="print">
+            <a:extLst>
+              <a:ext uri="{28A0092B-C50C-407E-A947-70E740481C1C}">
+                <a14:useLocalDpi xmlns:a14="http://schemas.microsoft.com/office/drawing/2010/main" val="0"/>
+              </a:ext>
+            </a:extLst>
+          </a:blip>
+          <a:srcRect/>
+          <a:stretch>
+            <a:fillRect/>
+          </a:stretch>
+        </p:blipFill>
+        <p:spPr bwMode="auto">
+          <a:xfrm>
+            <a:off x="4657299" y="2464688"/>
+            <a:ext cx="4385603" cy="1933386"/>
+          </a:xfrm>
+          <a:prstGeom prst="rect">
+            <a:avLst/>
+          </a:prstGeom>
+          <a:noFill/>
+          <a:ln>
+            <a:noFill/>
+          </a:ln>
+          <a:effectLst/>
+          <a:extLst>
+            <a:ext uri="{909E8E84-426E-40DD-AFC4-6F175D3DCCD1}">
+              <a14:hiddenFill xmlns:a14="http://schemas.microsoft.com/office/drawing/2010/main">
+                <a:solidFill>
+                  <a:schemeClr val="accent1"/>
+                </a:solidFill>
+              </a14:hiddenFill>
+            </a:ext>
+            <a:ext uri="{91240B29-F687-4F45-9708-019B960494DF}">
+              <a14:hiddenLine xmlns:a14="http://schemas.microsoft.com/office/drawing/2010/main" w="9525">
+                <a:solidFill>
+                  <a:schemeClr val="tx1"/>
+                </a:solidFill>
+                <a:miter lim="800000"/>
+                <a:headEnd/>
+                <a:tailEnd/>
+              </a14:hiddenLine>
+            </a:ext>
+            <a:ext uri="{AF507438-7753-43E0-B8FC-AC1667EBCBE1}">
+              <a14:hiddenEffects xmlns:a14="http://schemas.microsoft.com/office/drawing/2010/main">
+                <a:effectLst>
+                  <a:outerShdw dist="35921" dir="2700000" algn="ctr" rotWithShape="0">
+                    <a:schemeClr val="bg2"/>
+                  </a:outerShdw>
+                </a:effectLst>
+              </a14:hiddenEffects>
+            </a:ext>
+          </a:extLst>
+        </p:spPr>
+      </p:pic>
+      <p:pic>
+        <p:nvPicPr>
+          <p:cNvPr id="1035" name="Picture 11"/>
+          <p:cNvPicPr>
+            <a:picLocks noChangeAspect="1" noChangeArrowheads="1"/>
+          </p:cNvPicPr>
+          <p:nvPr/>
+        </p:nvPicPr>
+        <p:blipFill>
+          <a:blip r:embed="rId6" cstate="print">
+            <a:extLst>
+              <a:ext uri="{28A0092B-C50C-407E-A947-70E740481C1C}">
+                <a14:useLocalDpi xmlns:a14="http://schemas.microsoft.com/office/drawing/2010/main" val="0"/>
+              </a:ext>
+            </a:extLst>
+          </a:blip>
+          <a:srcRect/>
+          <a:stretch>
+            <a:fillRect/>
+          </a:stretch>
+        </p:blipFill>
+        <p:spPr bwMode="auto">
+          <a:xfrm>
+            <a:off x="76200" y="4619814"/>
+            <a:ext cx="4385603" cy="1933386"/>
+          </a:xfrm>
+          <a:prstGeom prst="rect">
+            <a:avLst/>
+          </a:prstGeom>
+          <a:noFill/>
+          <a:ln>
+            <a:noFill/>
+          </a:ln>
+          <a:effectLst/>
+          <a:extLst>
+            <a:ext uri="{909E8E84-426E-40DD-AFC4-6F175D3DCCD1}">
+              <a14:hiddenFill xmlns:a14="http://schemas.microsoft.com/office/drawing/2010/main">
+                <a:solidFill>
+                  <a:schemeClr val="accent1"/>
+                </a:solidFill>
+              </a14:hiddenFill>
+            </a:ext>
+            <a:ext uri="{91240B29-F687-4F45-9708-019B960494DF}">
+              <a14:hiddenLine xmlns:a14="http://schemas.microsoft.com/office/drawing/2010/main" w="9525">
+                <a:solidFill>
+                  <a:schemeClr val="tx1"/>
+                </a:solidFill>
+                <a:miter lim="800000"/>
+                <a:headEnd/>
+                <a:tailEnd/>
+              </a14:hiddenLine>
+            </a:ext>
+            <a:ext uri="{AF507438-7753-43E0-B8FC-AC1667EBCBE1}">
+              <a14:hiddenEffects xmlns:a14="http://schemas.microsoft.com/office/drawing/2010/main">
+                <a:effectLst>
+                  <a:outerShdw dist="35921" dir="2700000" algn="ctr" rotWithShape="0">
+                    <a:schemeClr val="bg2"/>
+                  </a:outerShdw>
+                </a:effectLst>
+              </a14:hiddenEffects>
+            </a:ext>
+          </a:extLst>
+        </p:spPr>
+      </p:pic>
+      <p:pic>
+        <p:nvPicPr>
+          <p:cNvPr id="1036" name="Picture 12"/>
+          <p:cNvPicPr>
+            <a:picLocks noChangeAspect="1" noChangeArrowheads="1"/>
+          </p:cNvPicPr>
+          <p:nvPr/>
+        </p:nvPicPr>
+        <p:blipFill>
+          <a:blip r:embed="rId7" cstate="print">
+            <a:extLst>
+              <a:ext uri="{28A0092B-C50C-407E-A947-70E740481C1C}">
+                <a14:useLocalDpi xmlns:a14="http://schemas.microsoft.com/office/drawing/2010/main" val="0"/>
+              </a:ext>
+            </a:extLst>
+          </a:blip>
+          <a:srcRect/>
+          <a:stretch>
+            <a:fillRect/>
+          </a:stretch>
+        </p:blipFill>
+        <p:spPr bwMode="auto">
+          <a:xfrm>
+            <a:off x="4648200" y="4618621"/>
+            <a:ext cx="4385603" cy="1934579"/>
+          </a:xfrm>
+          <a:prstGeom prst="rect">
+            <a:avLst/>
+          </a:prstGeom>
+          <a:noFill/>
+          <a:ln>
+            <a:noFill/>
+          </a:ln>
+          <a:effectLst/>
+          <a:extLst>
+            <a:ext uri="{909E8E84-426E-40DD-AFC4-6F175D3DCCD1}">
+              <a14:hiddenFill xmlns:a14="http://schemas.microsoft.com/office/drawing/2010/main">
+                <a:solidFill>
+                  <a:schemeClr val="accent1"/>
+                </a:solidFill>
+              </a14:hiddenFill>
+            </a:ext>
+            <a:ext uri="{91240B29-F687-4F45-9708-019B960494DF}">
+              <a14:hiddenLine xmlns:a14="http://schemas.microsoft.com/office/drawing/2010/main" w="9525">
+                <a:solidFill>
+                  <a:schemeClr val="tx1"/>
+                </a:solidFill>
+                <a:miter lim="800000"/>
+                <a:headEnd/>
+                <a:tailEnd/>
+              </a14:hiddenLine>
+            </a:ext>
+            <a:ext uri="{AF507438-7753-43E0-B8FC-AC1667EBCBE1}">
+              <a14:hiddenEffects xmlns:a14="http://schemas.microsoft.com/office/drawing/2010/main">
+                <a:effectLst>
+                  <a:outerShdw dist="35921" dir="2700000" algn="ctr" rotWithShape="0">
+                    <a:schemeClr val="bg2"/>
+                  </a:outerShdw>
+                </a:effectLst>
+              </a14:hiddenEffects>
+            </a:ext>
+          </a:extLst>
+        </p:spPr>
+      </p:pic>
+      <p:sp>
+        <p:nvSpPr>
+          <p:cNvPr id="8" name="TextBox 7"/>
+          <p:cNvSpPr txBox="1"/>
+          <p:nvPr/>
+        </p:nvSpPr>
+        <p:spPr>
+          <a:xfrm>
+            <a:off x="1517184" y="2166876"/>
+            <a:ext cx="2057400" cy="369332"/>
+          </a:xfrm>
+          <a:prstGeom prst="rect">
+            <a:avLst/>
+          </a:prstGeom>
+          <a:noFill/>
+        </p:spPr>
+        <p:txBody>
+          <a:bodyPr wrap="square" rtlCol="0">
+            <a:spAutoFit/>
+          </a:bodyPr>
+          <a:lstStyle/>
+          <a:p>
+            <a:pPr algn="ctr"/>
+            <a:r>
+              <a:rPr lang="en-US" dirty="0" smtClean="0"/>
+              <a:t>1 Mbps</a:t>
+            </a:r>
+            <a:endParaRPr lang="en-US" dirty="0"/>
+          </a:p>
+        </p:txBody>
+      </p:sp>
+      <p:sp>
+        <p:nvSpPr>
+          <p:cNvPr id="22" name="TextBox 21"/>
+          <p:cNvSpPr txBox="1"/>
+          <p:nvPr/>
+        </p:nvSpPr>
+        <p:spPr>
+          <a:xfrm>
+            <a:off x="6136944" y="2150388"/>
+            <a:ext cx="2057400" cy="369332"/>
+          </a:xfrm>
+          <a:prstGeom prst="rect">
+            <a:avLst/>
+          </a:prstGeom>
+          <a:noFill/>
+        </p:spPr>
+        <p:txBody>
+          <a:bodyPr wrap="square" rtlCol="0">
+            <a:spAutoFit/>
+          </a:bodyPr>
+          <a:lstStyle/>
+          <a:p>
+            <a:pPr algn="ctr"/>
+            <a:r>
+              <a:rPr lang="en-US" dirty="0"/>
+              <a:t>2</a:t>
+            </a:r>
+            <a:r>
+              <a:rPr lang="en-US" dirty="0" smtClean="0"/>
+              <a:t> Mbps</a:t>
+            </a:r>
+            <a:endParaRPr lang="en-US" dirty="0"/>
+          </a:p>
+        </p:txBody>
+      </p:sp>
+      <p:sp>
+        <p:nvSpPr>
+          <p:cNvPr id="23" name="TextBox 22"/>
+          <p:cNvSpPr txBox="1"/>
+          <p:nvPr/>
+        </p:nvSpPr>
+        <p:spPr>
+          <a:xfrm>
+            <a:off x="1524000" y="4327772"/>
+            <a:ext cx="2057400" cy="369332"/>
+          </a:xfrm>
+          <a:prstGeom prst="rect">
+            <a:avLst/>
+          </a:prstGeom>
+          <a:noFill/>
+        </p:spPr>
+        <p:txBody>
+          <a:bodyPr wrap="square" rtlCol="0">
+            <a:spAutoFit/>
+          </a:bodyPr>
+          <a:lstStyle/>
+          <a:p>
+            <a:pPr algn="ctr"/>
+            <a:r>
+              <a:rPr lang="en-US" dirty="0"/>
+              <a:t>4</a:t>
+            </a:r>
+            <a:r>
+              <a:rPr lang="en-US" dirty="0" smtClean="0"/>
+              <a:t> Mbps</a:t>
+            </a:r>
+            <a:endParaRPr lang="en-US" dirty="0"/>
+          </a:p>
+        </p:txBody>
+      </p:sp>
+      <p:sp>
+        <p:nvSpPr>
+          <p:cNvPr id="24" name="TextBox 23"/>
+          <p:cNvSpPr txBox="1"/>
+          <p:nvPr/>
+        </p:nvSpPr>
+        <p:spPr>
+          <a:xfrm>
+            <a:off x="6144904" y="4321792"/>
+            <a:ext cx="2057400" cy="369332"/>
+          </a:xfrm>
+          <a:prstGeom prst="rect">
+            <a:avLst/>
+          </a:prstGeom>
+          <a:noFill/>
+        </p:spPr>
+        <p:txBody>
+          <a:bodyPr wrap="square" rtlCol="0">
+            <a:spAutoFit/>
+          </a:bodyPr>
+          <a:lstStyle/>
+          <a:p>
+            <a:pPr algn="ctr"/>
+            <a:r>
+              <a:rPr lang="en-US" dirty="0" smtClean="0"/>
+              <a:t>8 Mbps</a:t>
+            </a:r>
+            <a:endParaRPr lang="en-US" dirty="0"/>
+          </a:p>
+        </p:txBody>
+      </p:sp>
+      <p:sp>
+        <p:nvSpPr>
+          <p:cNvPr id="25" name="TextBox 24"/>
+          <p:cNvSpPr txBox="1"/>
+          <p:nvPr/>
+        </p:nvSpPr>
+        <p:spPr>
+          <a:xfrm>
+            <a:off x="1524000" y="6488668"/>
+            <a:ext cx="2057400" cy="369332"/>
+          </a:xfrm>
+          <a:prstGeom prst="rect">
+            <a:avLst/>
+          </a:prstGeom>
+          <a:noFill/>
+        </p:spPr>
+        <p:txBody>
+          <a:bodyPr wrap="square" rtlCol="0">
+            <a:spAutoFit/>
+          </a:bodyPr>
+          <a:lstStyle/>
+          <a:p>
+            <a:pPr algn="ctr"/>
+            <a:r>
+              <a:rPr lang="en-US" dirty="0" smtClean="0"/>
+              <a:t>16 Mbps</a:t>
+            </a:r>
+            <a:endParaRPr lang="en-US" dirty="0"/>
+          </a:p>
+        </p:txBody>
+      </p:sp>
+      <p:sp>
+        <p:nvSpPr>
+          <p:cNvPr id="26" name="TextBox 25"/>
+          <p:cNvSpPr txBox="1"/>
+          <p:nvPr/>
+        </p:nvSpPr>
+        <p:spPr>
+          <a:xfrm>
+            <a:off x="6136944" y="6482688"/>
+            <a:ext cx="2057400" cy="369332"/>
+          </a:xfrm>
+          <a:prstGeom prst="rect">
+            <a:avLst/>
+          </a:prstGeom>
+          <a:noFill/>
+        </p:spPr>
+        <p:txBody>
+          <a:bodyPr wrap="square" rtlCol="0">
+            <a:spAutoFit/>
+          </a:bodyPr>
+          <a:lstStyle/>
+          <a:p>
+            <a:pPr algn="ctr"/>
+            <a:r>
+              <a:rPr lang="en-US" dirty="0" smtClean="0"/>
+              <a:t>32 Mbps</a:t>
+            </a:r>
+            <a:endParaRPr lang="en-US" dirty="0"/>
+          </a:p>
+        </p:txBody>
+      </p:sp>
+      <p:sp>
+        <p:nvSpPr>
+          <p:cNvPr id="27" name="TextBox 26"/>
+          <p:cNvSpPr txBox="1"/>
+          <p:nvPr/>
+        </p:nvSpPr>
+        <p:spPr>
+          <a:xfrm>
+            <a:off x="3505200" y="0"/>
+            <a:ext cx="2057400" cy="369332"/>
+          </a:xfrm>
+          <a:prstGeom prst="rect">
+            <a:avLst/>
+          </a:prstGeom>
+          <a:noFill/>
+        </p:spPr>
+        <p:txBody>
+          <a:bodyPr wrap="square" rtlCol="0">
+            <a:spAutoFit/>
+          </a:bodyPr>
+          <a:lstStyle/>
+          <a:p>
+            <a:pPr algn="ctr"/>
+            <a:r>
+              <a:rPr lang="en-US" dirty="0" smtClean="0"/>
+              <a:t>Delay</a:t>
+            </a:r>
+            <a:endParaRPr lang="en-US" dirty="0"/>
+          </a:p>
+        </p:txBody>
+      </p:sp>
+    </p:spTree>
+    <p:extLst>
+      <p:ext uri="{BB962C8B-B14F-4D97-AF65-F5344CB8AC3E}">
+        <p14:creationId xmlns:p14="http://schemas.microsoft.com/office/powerpoint/2010/main" val="1321072506"/>
+      </p:ext>
+    </p:extLst>
+  </p:cSld>
+  <p:clrMapOvr>
+    <a:masterClrMapping/>
+  </p:clrMapOvr>
+  <p:timing>
+    <p:tnLst>
+      <p:par>
+        <p:cTn id="1" dur="indefinite" restart="never" nodeType="tmRoot"/>
+      </p:par>
+    </p:tnLst>
+  </p:timing>
+</p:sld>
+</file>
+
+<file path=ppt/slides/slide29.xml><?xml version="1.0" encoding="utf-8"?>
+<p:sld xmlns:a="http://schemas.openxmlformats.org/drawingml/2006/main" xmlns:r="http://schemas.openxmlformats.org/officeDocument/2006/relationships" xmlns:p="http://schemas.openxmlformats.org/presentationml/2006/main">
+  <p:cSld>
+    <p:spTree>
+      <p:nvGrpSpPr>
+        <p:cNvPr id="1" name=""/>
+        <p:cNvGrpSpPr/>
+        <p:nvPr/>
+      </p:nvGrpSpPr>
+      <p:grpSpPr>
+        <a:xfrm>
+          <a:off x="0" y="0"/>
+          <a:ext cx="0" cy="0"/>
+          <a:chOff x="0" y="0"/>
+          <a:chExt cx="0" cy="0"/>
+        </a:xfrm>
+      </p:grpSpPr>
+      <p:sp>
+        <p:nvSpPr>
+          <p:cNvPr id="2" name="Slide Number Placeholder 1"/>
+          <p:cNvSpPr>
+            <a:spLocks noGrp="1"/>
+          </p:cNvSpPr>
+          <p:nvPr>
+            <p:ph type="sldNum" sz="quarter" idx="12"/>
+          </p:nvPr>
+        </p:nvSpPr>
+        <p:spPr>
+          <a:xfrm>
+            <a:off x="6553200" y="6492875"/>
+            <a:ext cx="2133600" cy="365125"/>
+          </a:xfrm>
+        </p:spPr>
+        <p:txBody>
+          <a:bodyPr/>
+          <a:lstStyle/>
+          <a:p>
+            <a:fld id="{CF142645-850A-43A6-BF6E-75FA772F8DCF}" type="slidenum">
+              <a:rPr lang="en-US" smtClean="0"/>
+              <a:pPr/>
+              <a:t>29</a:t>
+            </a:fld>
+            <a:endParaRPr lang="en-US" dirty="0"/>
+          </a:p>
+        </p:txBody>
+      </p:sp>
+      <p:pic>
+        <p:nvPicPr>
+          <p:cNvPr id="1030" name="Picture 6"/>
+          <p:cNvPicPr>
+            <a:picLocks noChangeAspect="1" noChangeArrowheads="1"/>
+          </p:cNvPicPr>
+          <p:nvPr/>
+        </p:nvPicPr>
+        <p:blipFill>
+          <a:blip r:embed="rId2" cstate="print">
+            <a:extLst>
+              <a:ext uri="{28A0092B-C50C-407E-A947-70E740481C1C}">
+                <a14:useLocalDpi xmlns:a14="http://schemas.microsoft.com/office/drawing/2010/main" val="0"/>
+              </a:ext>
+            </a:extLst>
+          </a:blip>
+          <a:srcRect/>
+          <a:stretch>
+            <a:fillRect/>
+          </a:stretch>
+        </p:blipFill>
+        <p:spPr bwMode="auto">
+          <a:xfrm>
+            <a:off x="76200" y="325269"/>
+            <a:ext cx="4385603" cy="1933386"/>
+          </a:xfrm>
+          <a:prstGeom prst="rect">
+            <a:avLst/>
+          </a:prstGeom>
+          <a:noFill/>
+          <a:ln>
+            <a:noFill/>
+          </a:ln>
+          <a:effectLst/>
+          <a:extLst>
+            <a:ext uri="{909E8E84-426E-40DD-AFC4-6F175D3DCCD1}">
+              <a14:hiddenFill xmlns:a14="http://schemas.microsoft.com/office/drawing/2010/main">
+                <a:solidFill>
+                  <a:schemeClr val="accent1"/>
+                </a:solidFill>
+              </a14:hiddenFill>
+            </a:ext>
+            <a:ext uri="{91240B29-F687-4F45-9708-019B960494DF}">
+              <a14:hiddenLine xmlns:a14="http://schemas.microsoft.com/office/drawing/2010/main" w="9525">
+                <a:solidFill>
+                  <a:schemeClr val="tx1"/>
+                </a:solidFill>
+                <a:miter lim="800000"/>
+                <a:headEnd/>
+                <a:tailEnd/>
+              </a14:hiddenLine>
+            </a:ext>
+            <a:ext uri="{AF507438-7753-43E0-B8FC-AC1667EBCBE1}">
+              <a14:hiddenEffects xmlns:a14="http://schemas.microsoft.com/office/drawing/2010/main">
+                <a:effectLst>
+                  <a:outerShdw dist="35921" dir="2700000" algn="ctr" rotWithShape="0">
+                    <a:schemeClr val="bg2"/>
+                  </a:outerShdw>
+                </a:effectLst>
+              </a14:hiddenEffects>
+            </a:ext>
+          </a:extLst>
+        </p:spPr>
+      </p:pic>
+      <p:pic>
+        <p:nvPicPr>
+          <p:cNvPr id="1031" name="Picture 7"/>
+          <p:cNvPicPr>
+            <a:picLocks noChangeAspect="1" noChangeArrowheads="1"/>
+          </p:cNvPicPr>
+          <p:nvPr/>
+        </p:nvPicPr>
+        <p:blipFill>
+          <a:blip r:embed="rId3" cstate="print">
+            <a:extLst>
+              <a:ext uri="{28A0092B-C50C-407E-A947-70E740481C1C}">
+                <a14:useLocalDpi xmlns:a14="http://schemas.microsoft.com/office/drawing/2010/main" val="0"/>
+              </a:ext>
+            </a:extLst>
+          </a:blip>
+          <a:srcRect/>
+          <a:stretch>
+            <a:fillRect/>
+          </a:stretch>
+        </p:blipFill>
+        <p:spPr bwMode="auto">
+          <a:xfrm>
+            <a:off x="4648200" y="325268"/>
+            <a:ext cx="4385603" cy="1933386"/>
+          </a:xfrm>
+          <a:prstGeom prst="rect">
+            <a:avLst/>
+          </a:prstGeom>
+          <a:noFill/>
+          <a:ln>
+            <a:noFill/>
+          </a:ln>
+          <a:effectLst/>
+          <a:extLst>
+            <a:ext uri="{909E8E84-426E-40DD-AFC4-6F175D3DCCD1}">
+              <a14:hiddenFill xmlns:a14="http://schemas.microsoft.com/office/drawing/2010/main">
+                <a:solidFill>
+                  <a:schemeClr val="accent1"/>
+                </a:solidFill>
+              </a14:hiddenFill>
+            </a:ext>
+            <a:ext uri="{91240B29-F687-4F45-9708-019B960494DF}">
+              <a14:hiddenLine xmlns:a14="http://schemas.microsoft.com/office/drawing/2010/main" w="9525">
+                <a:solidFill>
+                  <a:schemeClr val="tx1"/>
+                </a:solidFill>
+                <a:miter lim="800000"/>
+                <a:headEnd/>
+                <a:tailEnd/>
+              </a14:hiddenLine>
+            </a:ext>
+            <a:ext uri="{AF507438-7753-43E0-B8FC-AC1667EBCBE1}">
+              <a14:hiddenEffects xmlns:a14="http://schemas.microsoft.com/office/drawing/2010/main">
+                <a:effectLst>
+                  <a:outerShdw dist="35921" dir="2700000" algn="ctr" rotWithShape="0">
+                    <a:schemeClr val="bg2"/>
+                  </a:outerShdw>
+                </a:effectLst>
+              </a14:hiddenEffects>
+            </a:ext>
+          </a:extLst>
+        </p:spPr>
+      </p:pic>
+      <p:pic>
+        <p:nvPicPr>
+          <p:cNvPr id="1033" name="Picture 9"/>
+          <p:cNvPicPr>
+            <a:picLocks noChangeAspect="1" noChangeArrowheads="1"/>
+          </p:cNvPicPr>
+          <p:nvPr/>
+        </p:nvPicPr>
+        <p:blipFill>
+          <a:blip r:embed="rId4" cstate="print">
+            <a:extLst>
+              <a:ext uri="{28A0092B-C50C-407E-A947-70E740481C1C}">
+                <a14:useLocalDpi xmlns:a14="http://schemas.microsoft.com/office/drawing/2010/main" val="0"/>
+              </a:ext>
+            </a:extLst>
+          </a:blip>
+          <a:srcRect/>
+          <a:stretch>
+            <a:fillRect/>
+          </a:stretch>
+        </p:blipFill>
+        <p:spPr bwMode="auto">
+          <a:xfrm>
+            <a:off x="82901" y="2464688"/>
+            <a:ext cx="4385603" cy="1933386"/>
+          </a:xfrm>
+          <a:prstGeom prst="rect">
+            <a:avLst/>
+          </a:prstGeom>
+          <a:noFill/>
+          <a:ln>
+            <a:noFill/>
+          </a:ln>
+          <a:effectLst/>
+          <a:extLst>
+            <a:ext uri="{909E8E84-426E-40DD-AFC4-6F175D3DCCD1}">
+              <a14:hiddenFill xmlns:a14="http://schemas.microsoft.com/office/drawing/2010/main">
+                <a:solidFill>
+                  <a:schemeClr val="accent1"/>
+                </a:solidFill>
+              </a14:hiddenFill>
+            </a:ext>
+            <a:ext uri="{91240B29-F687-4F45-9708-019B960494DF}">
+              <a14:hiddenLine xmlns:a14="http://schemas.microsoft.com/office/drawing/2010/main" w="9525">
+                <a:solidFill>
+                  <a:schemeClr val="tx1"/>
+                </a:solidFill>
+                <a:miter lim="800000"/>
+                <a:headEnd/>
+                <a:tailEnd/>
+              </a14:hiddenLine>
+            </a:ext>
+            <a:ext uri="{AF507438-7753-43E0-B8FC-AC1667EBCBE1}">
+              <a14:hiddenEffects xmlns:a14="http://schemas.microsoft.com/office/drawing/2010/main">
+                <a:effectLst>
+                  <a:outerShdw dist="35921" dir="2700000" algn="ctr" rotWithShape="0">
+                    <a:schemeClr val="bg2"/>
+                  </a:outerShdw>
+                </a:effectLst>
+              </a14:hiddenEffects>
+            </a:ext>
+          </a:extLst>
+        </p:spPr>
+      </p:pic>
+      <p:pic>
+        <p:nvPicPr>
+          <p:cNvPr id="1034" name="Picture 10"/>
+          <p:cNvPicPr>
+            <a:picLocks noChangeAspect="1" noChangeArrowheads="1"/>
+          </p:cNvPicPr>
+          <p:nvPr/>
+        </p:nvPicPr>
+        <p:blipFill>
+          <a:blip r:embed="rId5" cstate="print">
+            <a:extLst>
+              <a:ext uri="{28A0092B-C50C-407E-A947-70E740481C1C}">
+                <a14:useLocalDpi xmlns:a14="http://schemas.microsoft.com/office/drawing/2010/main" val="0"/>
+              </a:ext>
+            </a:extLst>
+          </a:blip>
+          <a:srcRect/>
+          <a:stretch>
+            <a:fillRect/>
+          </a:stretch>
+        </p:blipFill>
+        <p:spPr bwMode="auto">
+          <a:xfrm>
+            <a:off x="4657299" y="2464688"/>
+            <a:ext cx="4385603" cy="1933386"/>
+          </a:xfrm>
+          <a:prstGeom prst="rect">
+            <a:avLst/>
+          </a:prstGeom>
+          <a:noFill/>
+          <a:ln>
+            <a:noFill/>
+          </a:ln>
+          <a:effectLst/>
+          <a:extLst>
+            <a:ext uri="{909E8E84-426E-40DD-AFC4-6F175D3DCCD1}">
+              <a14:hiddenFill xmlns:a14="http://schemas.microsoft.com/office/drawing/2010/main">
+                <a:solidFill>
+                  <a:schemeClr val="accent1"/>
+                </a:solidFill>
+              </a14:hiddenFill>
+            </a:ext>
+            <a:ext uri="{91240B29-F687-4F45-9708-019B960494DF}">
+              <a14:hiddenLine xmlns:a14="http://schemas.microsoft.com/office/drawing/2010/main" w="9525">
+                <a:solidFill>
+                  <a:schemeClr val="tx1"/>
+                </a:solidFill>
+                <a:miter lim="800000"/>
+                <a:headEnd/>
+                <a:tailEnd/>
+              </a14:hiddenLine>
+            </a:ext>
+            <a:ext uri="{AF507438-7753-43E0-B8FC-AC1667EBCBE1}">
+              <a14:hiddenEffects xmlns:a14="http://schemas.microsoft.com/office/drawing/2010/main">
+                <a:effectLst>
+                  <a:outerShdw dist="35921" dir="2700000" algn="ctr" rotWithShape="0">
+                    <a:schemeClr val="bg2"/>
+                  </a:outerShdw>
+                </a:effectLst>
+              </a14:hiddenEffects>
+            </a:ext>
+          </a:extLst>
+        </p:spPr>
+      </p:pic>
+      <p:pic>
+        <p:nvPicPr>
+          <p:cNvPr id="1035" name="Picture 11"/>
+          <p:cNvPicPr>
+            <a:picLocks noChangeAspect="1" noChangeArrowheads="1"/>
+          </p:cNvPicPr>
+          <p:nvPr/>
+        </p:nvPicPr>
+        <p:blipFill>
+          <a:blip r:embed="rId6" cstate="print">
+            <a:extLst>
+              <a:ext uri="{28A0092B-C50C-407E-A947-70E740481C1C}">
+                <a14:useLocalDpi xmlns:a14="http://schemas.microsoft.com/office/drawing/2010/main" val="0"/>
+              </a:ext>
+            </a:extLst>
+          </a:blip>
+          <a:srcRect/>
+          <a:stretch>
+            <a:fillRect/>
+          </a:stretch>
+        </p:blipFill>
+        <p:spPr bwMode="auto">
+          <a:xfrm>
+            <a:off x="76200" y="4619814"/>
+            <a:ext cx="4385603" cy="1933386"/>
+          </a:xfrm>
+          <a:prstGeom prst="rect">
+            <a:avLst/>
+          </a:prstGeom>
+          <a:noFill/>
+          <a:ln>
+            <a:noFill/>
+          </a:ln>
+          <a:effectLst/>
+          <a:extLst>
+            <a:ext uri="{909E8E84-426E-40DD-AFC4-6F175D3DCCD1}">
+              <a14:hiddenFill xmlns:a14="http://schemas.microsoft.com/office/drawing/2010/main">
+                <a:solidFill>
+                  <a:schemeClr val="accent1"/>
+                </a:solidFill>
+              </a14:hiddenFill>
+            </a:ext>
+            <a:ext uri="{91240B29-F687-4F45-9708-019B960494DF}">
+              <a14:hiddenLine xmlns:a14="http://schemas.microsoft.com/office/drawing/2010/main" w="9525">
+                <a:solidFill>
+                  <a:schemeClr val="tx1"/>
+                </a:solidFill>
+                <a:miter lim="800000"/>
+                <a:headEnd/>
+                <a:tailEnd/>
+              </a14:hiddenLine>
+            </a:ext>
+            <a:ext uri="{AF507438-7753-43E0-B8FC-AC1667EBCBE1}">
+              <a14:hiddenEffects xmlns:a14="http://schemas.microsoft.com/office/drawing/2010/main">
+                <a:effectLst>
+                  <a:outerShdw dist="35921" dir="2700000" algn="ctr" rotWithShape="0">
+                    <a:schemeClr val="bg2"/>
+                  </a:outerShdw>
+                </a:effectLst>
+              </a14:hiddenEffects>
+            </a:ext>
+          </a:extLst>
+        </p:spPr>
+      </p:pic>
+      <p:pic>
+        <p:nvPicPr>
+          <p:cNvPr id="1036" name="Picture 12"/>
+          <p:cNvPicPr>
+            <a:picLocks noChangeAspect="1" noChangeArrowheads="1"/>
+          </p:cNvPicPr>
+          <p:nvPr/>
+        </p:nvPicPr>
+        <p:blipFill>
+          <a:blip r:embed="rId7" cstate="print">
+            <a:extLst>
+              <a:ext uri="{28A0092B-C50C-407E-A947-70E740481C1C}">
+                <a14:useLocalDpi xmlns:a14="http://schemas.microsoft.com/office/drawing/2010/main" val="0"/>
+              </a:ext>
+            </a:extLst>
+          </a:blip>
+          <a:srcRect/>
+          <a:stretch>
+            <a:fillRect/>
+          </a:stretch>
+        </p:blipFill>
+        <p:spPr bwMode="auto">
+          <a:xfrm>
+            <a:off x="4648200" y="4618621"/>
+            <a:ext cx="4385603" cy="1934579"/>
+          </a:xfrm>
+          <a:prstGeom prst="rect">
+            <a:avLst/>
+          </a:prstGeom>
+          <a:noFill/>
+          <a:ln>
+            <a:noFill/>
+          </a:ln>
+          <a:effectLst/>
+          <a:extLst>
+            <a:ext uri="{909E8E84-426E-40DD-AFC4-6F175D3DCCD1}">
+              <a14:hiddenFill xmlns:a14="http://schemas.microsoft.com/office/drawing/2010/main">
+                <a:solidFill>
+                  <a:schemeClr val="accent1"/>
+                </a:solidFill>
+              </a14:hiddenFill>
+            </a:ext>
+            <a:ext uri="{91240B29-F687-4F45-9708-019B960494DF}">
+              <a14:hiddenLine xmlns:a14="http://schemas.microsoft.com/office/drawing/2010/main" w="9525">
+                <a:solidFill>
+                  <a:schemeClr val="tx1"/>
+                </a:solidFill>
+                <a:miter lim="800000"/>
+                <a:headEnd/>
+                <a:tailEnd/>
+              </a14:hiddenLine>
+            </a:ext>
+            <a:ext uri="{AF507438-7753-43E0-B8FC-AC1667EBCBE1}">
+              <a14:hiddenEffects xmlns:a14="http://schemas.microsoft.com/office/drawing/2010/main">
+                <a:effectLst>
+                  <a:outerShdw dist="35921" dir="2700000" algn="ctr" rotWithShape="0">
+                    <a:schemeClr val="bg2"/>
+                  </a:outerShdw>
+                </a:effectLst>
+              </a14:hiddenEffects>
+            </a:ext>
+          </a:extLst>
+        </p:spPr>
+      </p:pic>
+      <p:sp>
+        <p:nvSpPr>
+          <p:cNvPr id="8" name="TextBox 7"/>
+          <p:cNvSpPr txBox="1"/>
+          <p:nvPr/>
+        </p:nvSpPr>
+        <p:spPr>
+          <a:xfrm>
+            <a:off x="1517184" y="2166876"/>
+            <a:ext cx="2057400" cy="369332"/>
+          </a:xfrm>
+          <a:prstGeom prst="rect">
+            <a:avLst/>
+          </a:prstGeom>
+          <a:noFill/>
+        </p:spPr>
+        <p:txBody>
+          <a:bodyPr wrap="square" rtlCol="0">
+            <a:spAutoFit/>
+          </a:bodyPr>
+          <a:lstStyle/>
+          <a:p>
+            <a:pPr algn="ctr"/>
+            <a:r>
+              <a:rPr lang="en-US" dirty="0" smtClean="0"/>
+              <a:t>1 Mbps</a:t>
+            </a:r>
+            <a:endParaRPr lang="en-US" dirty="0"/>
+          </a:p>
+        </p:txBody>
+      </p:sp>
+      <p:sp>
+        <p:nvSpPr>
+          <p:cNvPr id="22" name="TextBox 21"/>
+          <p:cNvSpPr txBox="1"/>
+          <p:nvPr/>
+        </p:nvSpPr>
+        <p:spPr>
+          <a:xfrm>
+            <a:off x="6136944" y="2150388"/>
+            <a:ext cx="2057400" cy="369332"/>
+          </a:xfrm>
+          <a:prstGeom prst="rect">
+            <a:avLst/>
+          </a:prstGeom>
+          <a:noFill/>
+        </p:spPr>
+        <p:txBody>
+          <a:bodyPr wrap="square" rtlCol="0">
+            <a:spAutoFit/>
+          </a:bodyPr>
+          <a:lstStyle/>
+          <a:p>
+            <a:pPr algn="ctr"/>
+            <a:r>
+              <a:rPr lang="en-US" dirty="0"/>
+              <a:t>2</a:t>
+            </a:r>
+            <a:r>
+              <a:rPr lang="en-US" dirty="0" smtClean="0"/>
+              <a:t> Mbps</a:t>
+            </a:r>
+            <a:endParaRPr lang="en-US" dirty="0"/>
+          </a:p>
+        </p:txBody>
+      </p:sp>
+      <p:sp>
+        <p:nvSpPr>
+          <p:cNvPr id="23" name="TextBox 22"/>
+          <p:cNvSpPr txBox="1"/>
+          <p:nvPr/>
+        </p:nvSpPr>
+        <p:spPr>
+          <a:xfrm>
+            <a:off x="1524000" y="4327772"/>
+            <a:ext cx="2057400" cy="369332"/>
+          </a:xfrm>
+          <a:prstGeom prst="rect">
+            <a:avLst/>
+          </a:prstGeom>
+          <a:noFill/>
+        </p:spPr>
+        <p:txBody>
+          <a:bodyPr wrap="square" rtlCol="0">
+            <a:spAutoFit/>
+          </a:bodyPr>
+          <a:lstStyle/>
+          <a:p>
+            <a:pPr algn="ctr"/>
+            <a:r>
+              <a:rPr lang="en-US" dirty="0"/>
+              <a:t>4</a:t>
+            </a:r>
+            <a:r>
+              <a:rPr lang="en-US" dirty="0" smtClean="0"/>
+              <a:t> Mbps</a:t>
+            </a:r>
+            <a:endParaRPr lang="en-US" dirty="0"/>
+          </a:p>
+        </p:txBody>
+      </p:sp>
+      <p:sp>
+        <p:nvSpPr>
+          <p:cNvPr id="24" name="TextBox 23"/>
+          <p:cNvSpPr txBox="1"/>
+          <p:nvPr/>
+        </p:nvSpPr>
+        <p:spPr>
+          <a:xfrm>
+            <a:off x="6144904" y="4321792"/>
+            <a:ext cx="2057400" cy="369332"/>
+          </a:xfrm>
+          <a:prstGeom prst="rect">
+            <a:avLst/>
+          </a:prstGeom>
+          <a:noFill/>
+        </p:spPr>
+        <p:txBody>
+          <a:bodyPr wrap="square" rtlCol="0">
+            <a:spAutoFit/>
+          </a:bodyPr>
+          <a:lstStyle/>
+          <a:p>
+            <a:pPr algn="ctr"/>
+            <a:r>
+              <a:rPr lang="en-US" dirty="0" smtClean="0"/>
+              <a:t>8 Mbps</a:t>
+            </a:r>
+            <a:endParaRPr lang="en-US" dirty="0"/>
+          </a:p>
+        </p:txBody>
+      </p:sp>
+      <p:sp>
+        <p:nvSpPr>
+          <p:cNvPr id="25" name="TextBox 24"/>
+          <p:cNvSpPr txBox="1"/>
+          <p:nvPr/>
+        </p:nvSpPr>
+        <p:spPr>
+          <a:xfrm>
+            <a:off x="1524000" y="6488668"/>
+            <a:ext cx="2057400" cy="369332"/>
+          </a:xfrm>
+          <a:prstGeom prst="rect">
+            <a:avLst/>
+          </a:prstGeom>
+          <a:noFill/>
+        </p:spPr>
+        <p:txBody>
+          <a:bodyPr wrap="square" rtlCol="0">
+            <a:spAutoFit/>
+          </a:bodyPr>
+          <a:lstStyle/>
+          <a:p>
+            <a:pPr algn="ctr"/>
+            <a:r>
+              <a:rPr lang="en-US" dirty="0" smtClean="0"/>
+              <a:t>16 Mbps</a:t>
+            </a:r>
+            <a:endParaRPr lang="en-US" dirty="0"/>
+          </a:p>
+        </p:txBody>
+      </p:sp>
+      <p:sp>
+        <p:nvSpPr>
+          <p:cNvPr id="26" name="TextBox 25"/>
+          <p:cNvSpPr txBox="1"/>
+          <p:nvPr/>
+        </p:nvSpPr>
+        <p:spPr>
+          <a:xfrm>
+            <a:off x="6136944" y="6482688"/>
+            <a:ext cx="2057400" cy="369332"/>
+          </a:xfrm>
+          <a:prstGeom prst="rect">
+            <a:avLst/>
+          </a:prstGeom>
+          <a:noFill/>
+        </p:spPr>
+        <p:txBody>
+          <a:bodyPr wrap="square" rtlCol="0">
+            <a:spAutoFit/>
+          </a:bodyPr>
+          <a:lstStyle/>
+          <a:p>
+            <a:pPr algn="ctr"/>
+            <a:r>
+              <a:rPr lang="en-US" dirty="0" smtClean="0"/>
+              <a:t>32 Mbps</a:t>
+            </a:r>
+            <a:endParaRPr lang="en-US" dirty="0"/>
+          </a:p>
+        </p:txBody>
+      </p:sp>
+      <p:sp>
+        <p:nvSpPr>
+          <p:cNvPr id="27" name="TextBox 26"/>
+          <p:cNvSpPr txBox="1"/>
+          <p:nvPr/>
+        </p:nvSpPr>
+        <p:spPr>
+          <a:xfrm>
+            <a:off x="3505200" y="0"/>
+            <a:ext cx="2057400" cy="369332"/>
+          </a:xfrm>
+          <a:prstGeom prst="rect">
+            <a:avLst/>
+          </a:prstGeom>
+          <a:noFill/>
+        </p:spPr>
+        <p:txBody>
+          <a:bodyPr wrap="square" rtlCol="0">
+            <a:spAutoFit/>
+          </a:bodyPr>
+          <a:lstStyle/>
+          <a:p>
+            <a:pPr algn="ctr"/>
+            <a:r>
+              <a:rPr lang="en-US" dirty="0" smtClean="0"/>
+              <a:t>Throughput</a:t>
+            </a:r>
+            <a:endParaRPr lang="en-US" dirty="0"/>
+          </a:p>
+        </p:txBody>
+      </p:sp>
+    </p:spTree>
+    <p:extLst>
+      <p:ext uri="{BB962C8B-B14F-4D97-AF65-F5344CB8AC3E}">
+        <p14:creationId xmlns:p14="http://schemas.microsoft.com/office/powerpoint/2010/main" val="3711847406"/>
+      </p:ext>
+    </p:extLst>
+  </p:cSld>
+  <p:clrMapOvr>
+    <a:masterClrMapping/>
+  </p:clrMapOvr>
+  <p:timing>
+    <p:tnLst>
+      <p:par>
+        <p:cTn id="1" dur="indefinite" restart="never" nodeType="tmRoot"/>
+      </p:par>
+    </p:tnLst>
+  </p:timing>
+</p:sld>
+</file>
+
+<file path=ppt/slides/slide3.xml><?xml version="1.0" encoding="utf-8"?>
+<p:sld xmlns:a="http://schemas.openxmlformats.org/drawingml/2006/main" xmlns:r="http://schemas.openxmlformats.org/officeDocument/2006/relationships" xmlns:p="http://schemas.openxmlformats.org/presentationml/2006/main">
+  <p:cSld>
+    <p:spTree>
+      <p:nvGrpSpPr>
+        <p:cNvPr id="1" name=""/>
+        <p:cNvGrpSpPr/>
+        <p:nvPr/>
+      </p:nvGrpSpPr>
+      <p:grpSpPr>
+        <a:xfrm>
+          <a:off x="0" y="0"/>
+          <a:ext cx="0" cy="0"/>
+          <a:chOff x="0" y="0"/>
+          <a:chExt cx="0" cy="0"/>
+        </a:xfrm>
+      </p:grpSpPr>
+      <p:sp>
+        <p:nvSpPr>
+          <p:cNvPr id="2" name="Title 1"/>
+          <p:cNvSpPr>
+            <a:spLocks noGrp="1"/>
+          </p:cNvSpPr>
+          <p:nvPr>
+            <p:ph type="title"/>
+          </p:nvPr>
+        </p:nvSpPr>
+        <p:spPr/>
+        <p:txBody>
+          <a:bodyPr/>
+          <a:lstStyle/>
+          <a:p>
+            <a:r>
+              <a:rPr lang="en-US" dirty="0" smtClean="0"/>
+              <a:t>Background of Our Study</a:t>
+            </a:r>
+            <a:endParaRPr lang="en-US" dirty="0"/>
+          </a:p>
+        </p:txBody>
+      </p:sp>
+      <p:sp>
+        <p:nvSpPr>
+          <p:cNvPr id="3" name="Content Placeholder 2"/>
+          <p:cNvSpPr>
+            <a:spLocks noGrp="1"/>
+          </p:cNvSpPr>
+          <p:nvPr>
+            <p:ph idx="1"/>
+          </p:nvPr>
+        </p:nvSpPr>
+        <p:spPr/>
+        <p:txBody>
+          <a:bodyPr/>
+          <a:lstStyle/>
+          <a:p>
+            <a:r>
+              <a:rPr lang="en-US" dirty="0" smtClean="0"/>
+              <a:t>How to increase the spectrum utilization?</a:t>
+            </a:r>
+            <a:endParaRPr lang="en-US" dirty="0"/>
+          </a:p>
+        </p:txBody>
+      </p:sp>
+      <p:pic>
+        <p:nvPicPr>
+          <p:cNvPr id="7" name="Picture 6" descr="crn-0.png"/>
+          <p:cNvPicPr>
+            <a:picLocks noChangeAspect="1"/>
+          </p:cNvPicPr>
+          <p:nvPr/>
+        </p:nvPicPr>
+        <p:blipFill>
+          <a:blip r:embed="rId2"/>
+          <a:stretch>
+            <a:fillRect/>
+          </a:stretch>
+        </p:blipFill>
+        <p:spPr>
+          <a:xfrm>
+            <a:off x="1879600" y="2667000"/>
+            <a:ext cx="5384800" cy="4038600"/>
+          </a:xfrm>
+          <a:prstGeom prst="rect">
+            <a:avLst/>
+          </a:prstGeom>
+        </p:spPr>
+      </p:pic>
+      <p:sp>
+        <p:nvSpPr>
+          <p:cNvPr id="5" name="Slide Number Placeholder 4"/>
+          <p:cNvSpPr>
+            <a:spLocks noGrp="1"/>
+          </p:cNvSpPr>
+          <p:nvPr>
+            <p:ph type="sldNum" sz="quarter" idx="12"/>
+          </p:nvPr>
+        </p:nvSpPr>
+        <p:spPr/>
+        <p:txBody>
+          <a:bodyPr/>
+          <a:lstStyle/>
+          <a:p>
+            <a:fld id="{CF142645-850A-43A6-BF6E-75FA772F8DCF}" type="slidenum">
+              <a:rPr lang="en-US" smtClean="0"/>
+              <a:pPr/>
+              <a:t>3</a:t>
+            </a:fld>
+            <a:endParaRPr lang="en-US" dirty="0"/>
+          </a:p>
+        </p:txBody>
+      </p:sp>
+      <p:pic>
+        <p:nvPicPr>
+          <p:cNvPr id="9" name="Picture 8" descr="pu.png"/>
+          <p:cNvPicPr>
+            <a:picLocks noChangeAspect="1"/>
+          </p:cNvPicPr>
+          <p:nvPr/>
+        </p:nvPicPr>
+        <p:blipFill>
+          <a:blip r:embed="rId3" cstate="print"/>
+          <a:srcRect l="34127" t="20370" r="32011" b="20370"/>
+          <a:stretch>
+            <a:fillRect/>
+          </a:stretch>
+        </p:blipFill>
+        <p:spPr>
+          <a:xfrm>
+            <a:off x="1981200" y="4073216"/>
+            <a:ext cx="533400" cy="700088"/>
+          </a:xfrm>
+          <a:prstGeom prst="rect">
+            <a:avLst/>
+          </a:prstGeom>
+        </p:spPr>
+      </p:pic>
+      <p:pic>
+        <p:nvPicPr>
+          <p:cNvPr id="10" name="Picture 9" descr="pu.png"/>
+          <p:cNvPicPr>
+            <a:picLocks noChangeAspect="1"/>
+          </p:cNvPicPr>
+          <p:nvPr/>
+        </p:nvPicPr>
+        <p:blipFill>
+          <a:blip r:embed="rId3" cstate="print"/>
+          <a:srcRect l="34127" t="20370" r="32011" b="20370"/>
+          <a:stretch>
+            <a:fillRect/>
+          </a:stretch>
+        </p:blipFill>
+        <p:spPr>
+          <a:xfrm>
+            <a:off x="1445528" y="4079544"/>
+            <a:ext cx="533400" cy="700088"/>
+          </a:xfrm>
+          <a:prstGeom prst="rect">
+            <a:avLst/>
+          </a:prstGeom>
+        </p:spPr>
+      </p:pic>
+    </p:spTree>
+  </p:cSld>
+  <p:clrMapOvr>
+    <a:masterClrMapping/>
+  </p:clrMapOvr>
+  <p:timing>
+    <p:tnLst>
+      <p:par>
+        <p:cTn id="1" dur="indefinite" restart="never" nodeType="tmRoot">
+          <p:childTnLst>
+            <p:seq concurrent="1" nextAc="seek">
+              <p:cTn id="2" dur="indefinite" nodeType="mainSeq">
+                <p:childTnLst>
+                  <p:par>
+                    <p:cTn id="3" fill="hold">
+                      <p:stCondLst>
+                        <p:cond delay="indefinite"/>
+                      </p:stCondLst>
+                      <p:childTnLst>
+                        <p:par>
+                          <p:cTn id="4" fill="hold">
+                            <p:stCondLst>
+                              <p:cond delay="0"/>
+                            </p:stCondLst>
+                            <p:childTnLst>
+                              <p:par>
+                                <p:cTn id="5" presetID="0" presetClass="path" presetSubtype="0" accel="50000" decel="50000" fill="hold" nodeType="clickEffect">
+                                  <p:stCondLst>
+                                    <p:cond delay="0"/>
+                                  </p:stCondLst>
+                                  <p:childTnLst>
+                                    <p:animMotion origin="layout" path="M 0.0375 -0.01156 L 0.4375 -0.18918 " pathEditMode="relative" ptsTypes="AA">
+                                      <p:cBhvr>
+                                        <p:cTn id="6" dur="2000" fill="hold"/>
+                                        <p:tgtEl>
+                                          <p:spTgt spid="9"/>
+                                        </p:tgtEl>
+                                        <p:attrNameLst>
+                                          <p:attrName>ppt_x</p:attrName>
+                                          <p:attrName>ppt_y</p:attrName>
+                                        </p:attrNameLst>
+                                      </p:cBhvr>
+                                    </p:animMotion>
+                                  </p:childTnLst>
+                                </p:cTn>
+                              </p:par>
+                              <p:par>
+                                <p:cTn id="7" presetID="0" presetClass="path" presetSubtype="0" accel="50000" decel="50000" fill="hold" nodeType="withEffect">
+                                  <p:stCondLst>
+                                    <p:cond delay="0"/>
+                                  </p:stCondLst>
+                                  <p:childTnLst>
+                                    <p:animMotion origin="layout" path="M 3.61111E-6 4.10731E-6 L 0.496 0.18732 " pathEditMode="relative" rAng="0" ptsTypes="AA">
+                                      <p:cBhvr>
+                                        <p:cTn id="8" dur="2000" fill="hold"/>
+                                        <p:tgtEl>
+                                          <p:spTgt spid="10"/>
+                                        </p:tgtEl>
+                                        <p:attrNameLst>
+                                          <p:attrName>ppt_x</p:attrName>
+                                          <p:attrName>ppt_y</p:attrName>
+                                        </p:attrNameLst>
+                                      </p:cBhvr>
+                                      <p:rCtr x="24800" y="9400"/>
+                                    </p:animMotion>
+                                  </p:childTnLst>
+                                </p:cTn>
+                              </p:par>
+                            </p:childTnLst>
+                          </p:cTn>
+                        </p:par>
+                      </p:childTnLst>
+                    </p:cTn>
+                  </p:par>
+                </p:childTnLst>
+              </p:cTn>
+              <p:prevCondLst>
+                <p:cond evt="onPrev" delay="0">
+                  <p:tgtEl>
+                    <p:sldTgt/>
+                  </p:tgtEl>
+                </p:cond>
+              </p:prevCondLst>
+              <p:nextCondLst>
+                <p:cond evt="onNext" delay="0">
+                  <p:tgtEl>
+                    <p:sldTgt/>
+                  </p:tgtEl>
+                </p:cond>
+              </p:nextCondLst>
+            </p:seq>
+          </p:childTnLst>
+        </p:cTn>
+      </p:par>
+    </p:tnLst>
+  </p:timing>
+</p:sld>
+</file>
+
+<file path=ppt/slides/slide30.xml><?xml version="1.0" encoding="utf-8"?>
+<p:sld xmlns:a="http://schemas.openxmlformats.org/drawingml/2006/main" xmlns:r="http://schemas.openxmlformats.org/officeDocument/2006/relationships" xmlns:p="http://schemas.openxmlformats.org/presentationml/2006/main">
+  <p:cSld>
+    <p:spTree>
+      <p:nvGrpSpPr>
+        <p:cNvPr id="1" name=""/>
+        <p:cNvGrpSpPr/>
+        <p:nvPr/>
+      </p:nvGrpSpPr>
+      <p:grpSpPr>
+        <a:xfrm>
+          <a:off x="0" y="0"/>
+          <a:ext cx="0" cy="0"/>
+          <a:chOff x="0" y="0"/>
+          <a:chExt cx="0" cy="0"/>
+        </a:xfrm>
+      </p:grpSpPr>
+      <p:sp>
+        <p:nvSpPr>
+          <p:cNvPr id="2" name="Title 1"/>
+          <p:cNvSpPr>
+            <a:spLocks noGrp="1"/>
+          </p:cNvSpPr>
+          <p:nvPr>
+            <p:ph type="title"/>
+          </p:nvPr>
+        </p:nvSpPr>
+        <p:spPr/>
+        <p:txBody>
+          <a:bodyPr/>
+          <a:lstStyle/>
+          <a:p>
+            <a:r>
+              <a:rPr lang="en-US" dirty="0" smtClean="0"/>
+              <a:t>Results Obtained So Far</a:t>
+            </a:r>
+            <a:endParaRPr lang="en-US" dirty="0"/>
+          </a:p>
+        </p:txBody>
+      </p:sp>
+      <p:sp>
+        <p:nvSpPr>
+          <p:cNvPr id="3" name="Content Placeholder 2"/>
+          <p:cNvSpPr>
+            <a:spLocks noGrp="1"/>
+          </p:cNvSpPr>
+          <p:nvPr>
+            <p:ph idx="1"/>
+          </p:nvPr>
+        </p:nvSpPr>
+        <p:spPr/>
+        <p:txBody>
+          <a:bodyPr/>
+          <a:lstStyle/>
+          <a:p>
+            <a:r>
+              <a:rPr lang="en-US" dirty="0" smtClean="0"/>
+              <a:t>Constant throughput degradation is no longer present</a:t>
+            </a:r>
+            <a:endParaRPr lang="en-US" dirty="0"/>
+          </a:p>
+        </p:txBody>
+      </p:sp>
+      <p:sp>
+        <p:nvSpPr>
+          <p:cNvPr id="5" name="Slide Number Placeholder 4"/>
+          <p:cNvSpPr>
+            <a:spLocks noGrp="1"/>
+          </p:cNvSpPr>
+          <p:nvPr>
+            <p:ph type="sldNum" sz="quarter" idx="12"/>
+          </p:nvPr>
+        </p:nvSpPr>
+        <p:spPr/>
+        <p:txBody>
+          <a:bodyPr/>
+          <a:lstStyle/>
+          <a:p>
+            <a:fld id="{CF142645-850A-43A6-BF6E-75FA772F8DCF}" type="slidenum">
+              <a:rPr lang="en-US" smtClean="0"/>
+              <a:pPr/>
+              <a:t>30</a:t>
             </a:fld>
             <a:endParaRPr lang="en-US" dirty="0"/>
           </a:p>
@@ -20475,7 +22374,7 @@
 </p:sld>
 </file>
 
-<file path=ppt/slides/slide28.xml><?xml version="1.0" encoding="utf-8"?>
+<file path=ppt/slides/slide31.xml><?xml version="1.0" encoding="utf-8"?>
 <p:sld xmlns:a="http://schemas.openxmlformats.org/drawingml/2006/main" xmlns:r="http://schemas.openxmlformats.org/officeDocument/2006/relationships" xmlns:p="http://schemas.openxmlformats.org/presentationml/2006/main">
   <p:cSld>
     <p:spTree>
@@ -20539,11 +22438,7 @@
             <a:pPr lvl="1"/>
             <a:r>
               <a:rPr lang="en-US" dirty="0" smtClean="0"/>
-              <a:t>delay </a:t>
-            </a:r>
-            <a:r>
-              <a:rPr lang="en-US" dirty="0" smtClean="0"/>
-              <a:t>is almost constant </a:t>
+              <a:t>Delay is almost constant</a:t>
             </a:r>
             <a:endParaRPr lang="en-US" dirty="0"/>
           </a:p>
@@ -20567,294 +22462,7 @@
             <a:fld id="{CF142645-850A-43A6-BF6E-75FA772F8DCF}" type="slidenum">
               <a:rPr lang="en-US" smtClean="0"/>
               <a:pPr/>
-              <a:t>28</a:t>
-            </a:fld>
-            <a:endParaRPr lang="en-US" dirty="0"/>
-          </a:p>
-        </p:txBody>
-      </p:sp>
-      <p:pic>
-        <p:nvPicPr>
-          <p:cNvPr id="4098" name="Picture 2"/>
-          <p:cNvPicPr>
-            <a:picLocks noChangeAspect="1" noChangeArrowheads="1"/>
-          </p:cNvPicPr>
-          <p:nvPr/>
-        </p:nvPicPr>
-        <p:blipFill>
-          <a:blip r:embed="rId2">
-            <a:extLst>
-              <a:ext uri="{28A0092B-C50C-407E-A947-70E740481C1C}">
-                <a14:useLocalDpi xmlns:a14="http://schemas.microsoft.com/office/drawing/2010/main" val="0"/>
-              </a:ext>
-            </a:extLst>
-          </a:blip>
-          <a:srcRect/>
-          <a:stretch>
-            <a:fillRect/>
-          </a:stretch>
-        </p:blipFill>
-        <p:spPr bwMode="auto">
-          <a:xfrm>
-            <a:off x="264181" y="3165764"/>
-            <a:ext cx="8651219" cy="3463636"/>
-          </a:xfrm>
-          <a:prstGeom prst="rect">
-            <a:avLst/>
-          </a:prstGeom>
-          <a:noFill/>
-          <a:ln>
-            <a:noFill/>
-          </a:ln>
-          <a:effectLst/>
-          <a:extLst>
-            <a:ext uri="{909E8E84-426E-40DD-AFC4-6F175D3DCCD1}">
-              <a14:hiddenFill xmlns:a14="http://schemas.microsoft.com/office/drawing/2010/main">
-                <a:solidFill>
-                  <a:schemeClr val="accent1"/>
-                </a:solidFill>
-              </a14:hiddenFill>
-            </a:ext>
-            <a:ext uri="{91240B29-F687-4F45-9708-019B960494DF}">
-              <a14:hiddenLine xmlns:a14="http://schemas.microsoft.com/office/drawing/2010/main" w="9525">
-                <a:solidFill>
-                  <a:schemeClr val="tx1"/>
-                </a:solidFill>
-                <a:miter lim="800000"/>
-                <a:headEnd/>
-                <a:tailEnd/>
-              </a14:hiddenLine>
-            </a:ext>
-            <a:ext uri="{AF507438-7753-43E0-B8FC-AC1667EBCBE1}">
-              <a14:hiddenEffects xmlns:a14="http://schemas.microsoft.com/office/drawing/2010/main">
-                <a:effectLst>
-                  <a:outerShdw dist="35921" dir="2700000" algn="ctr" rotWithShape="0">
-                    <a:schemeClr val="bg2"/>
-                  </a:outerShdw>
-                </a:effectLst>
-              </a14:hiddenEffects>
-            </a:ext>
-          </a:extLst>
-        </p:spPr>
-      </p:pic>
-      <p:cxnSp>
-        <p:nvCxnSpPr>
-          <p:cNvPr id="8" name="Straight Arrow Connector 7"/>
-          <p:cNvCxnSpPr/>
-          <p:nvPr/>
-        </p:nvCxnSpPr>
-        <p:spPr>
-          <a:xfrm flipV="1">
-            <a:off x="1752600" y="5676900"/>
-            <a:ext cx="6858000" cy="114300"/>
-          </a:xfrm>
-          <a:prstGeom prst="straightConnector1">
-            <a:avLst/>
-          </a:prstGeom>
-          <a:ln w="152400">
-            <a:solidFill>
-              <a:schemeClr val="accent2">
-                <a:lumMod val="75000"/>
-              </a:schemeClr>
-            </a:solidFill>
-            <a:tailEnd type="triangle"/>
-          </a:ln>
-        </p:spPr>
-        <p:style>
-          <a:lnRef idx="1">
-            <a:schemeClr val="accent1"/>
-          </a:lnRef>
-          <a:fillRef idx="0">
-            <a:schemeClr val="accent1"/>
-          </a:fillRef>
-          <a:effectRef idx="0">
-            <a:schemeClr val="accent1"/>
-          </a:effectRef>
-          <a:fontRef idx="minor">
-            <a:schemeClr val="tx1"/>
-          </a:fontRef>
-        </p:style>
-      </p:cxnSp>
-    </p:spTree>
-  </p:cSld>
-  <p:clrMapOvr>
-    <a:masterClrMapping/>
-  </p:clrMapOvr>
-  <p:timing>
-    <p:tnLst>
-      <p:par>
-        <p:cTn id="1" dur="indefinite" restart="never" nodeType="tmRoot">
-          <p:childTnLst>
-            <p:seq concurrent="1" nextAc="seek">
-              <p:cTn id="2" dur="indefinite" nodeType="mainSeq">
-                <p:childTnLst>
-                  <p:par>
-                    <p:cTn id="3" fill="hold">
-                      <p:stCondLst>
-                        <p:cond delay="indefinite"/>
-                      </p:stCondLst>
-                      <p:childTnLst>
-                        <p:par>
-                          <p:cTn id="4" fill="hold">
-                            <p:stCondLst>
-                              <p:cond delay="0"/>
-                            </p:stCondLst>
-                            <p:childTnLst>
-                              <p:par>
-                                <p:cTn id="5" presetID="22" presetClass="entr" presetSubtype="8" fill="hold" nodeType="clickEffect">
-                                  <p:stCondLst>
-                                    <p:cond delay="0"/>
-                                  </p:stCondLst>
-                                  <p:childTnLst>
-                                    <p:set>
-                                      <p:cBhvr>
-                                        <p:cTn id="6" dur="1" fill="hold">
-                                          <p:stCondLst>
-                                            <p:cond delay="0"/>
-                                          </p:stCondLst>
-                                        </p:cTn>
-                                        <p:tgtEl>
-                                          <p:spTgt spid="8"/>
-                                        </p:tgtEl>
-                                        <p:attrNameLst>
-                                          <p:attrName>style.visibility</p:attrName>
-                                        </p:attrNameLst>
-                                      </p:cBhvr>
-                                      <p:to>
-                                        <p:strVal val="visible"/>
-                                      </p:to>
-                                    </p:set>
-                                    <p:animEffect transition="in" filter="wipe(left)">
-                                      <p:cBhvr>
-                                        <p:cTn id="7" dur="500"/>
-                                        <p:tgtEl>
-                                          <p:spTgt spid="8"/>
-                                        </p:tgtEl>
-                                      </p:cBhvr>
-                                    </p:animEffect>
-                                  </p:childTnLst>
-                                </p:cTn>
-                              </p:par>
-                            </p:childTnLst>
-                          </p:cTn>
-                        </p:par>
-                      </p:childTnLst>
-                    </p:cTn>
-                  </p:par>
-                </p:childTnLst>
-              </p:cTn>
-              <p:prevCondLst>
-                <p:cond evt="onPrev" delay="0">
-                  <p:tgtEl>
-                    <p:sldTgt/>
-                  </p:tgtEl>
-                </p:cond>
-              </p:prevCondLst>
-              <p:nextCondLst>
-                <p:cond evt="onNext" delay="0">
-                  <p:tgtEl>
-                    <p:sldTgt/>
-                  </p:tgtEl>
-                </p:cond>
-              </p:nextCondLst>
-            </p:seq>
-          </p:childTnLst>
-        </p:cTn>
-      </p:par>
-    </p:tnLst>
-  </p:timing>
-</p:sld>
-</file>
-
-<file path=ppt/slides/slide29.xml><?xml version="1.0" encoding="utf-8"?>
-<p:sld xmlns:a="http://schemas.openxmlformats.org/drawingml/2006/main" xmlns:r="http://schemas.openxmlformats.org/officeDocument/2006/relationships" xmlns:p="http://schemas.openxmlformats.org/presentationml/2006/main">
-  <p:cSld>
-    <p:spTree>
-      <p:nvGrpSpPr>
-        <p:cNvPr id="1" name=""/>
-        <p:cNvGrpSpPr/>
-        <p:nvPr/>
-      </p:nvGrpSpPr>
-      <p:grpSpPr>
-        <a:xfrm>
-          <a:off x="0" y="0"/>
-          <a:ext cx="0" cy="0"/>
-          <a:chOff x="0" y="0"/>
-          <a:chExt cx="0" cy="0"/>
-        </a:xfrm>
-      </p:grpSpPr>
-      <p:sp>
-        <p:nvSpPr>
-          <p:cNvPr id="2" name="Title 1"/>
-          <p:cNvSpPr>
-            <a:spLocks noGrp="1"/>
-          </p:cNvSpPr>
-          <p:nvPr>
-            <p:ph type="title"/>
-          </p:nvPr>
-        </p:nvSpPr>
-        <p:spPr/>
-        <p:txBody>
-          <a:bodyPr/>
-          <a:lstStyle/>
-          <a:p>
-            <a:r>
-              <a:rPr lang="en-US" dirty="0" smtClean="0"/>
-              <a:t>Results Obtained So Far [contd.]</a:t>
-            </a:r>
-            <a:endParaRPr lang="en-US" dirty="0"/>
-          </a:p>
-        </p:txBody>
-      </p:sp>
-      <p:sp>
-        <p:nvSpPr>
-          <p:cNvPr id="3" name="Content Placeholder 2"/>
-          <p:cNvSpPr>
-            <a:spLocks noGrp="1"/>
-          </p:cNvSpPr>
-          <p:nvPr>
-            <p:ph idx="1"/>
-          </p:nvPr>
-        </p:nvSpPr>
-        <p:spPr/>
-        <p:txBody>
-          <a:bodyPr/>
-          <a:lstStyle/>
-          <a:p>
-            <a:r>
-              <a:rPr lang="en-US" dirty="0" smtClean="0"/>
-              <a:t>Constant throughput degradation is no longer present</a:t>
-            </a:r>
-          </a:p>
-          <a:p>
-            <a:pPr lvl="1"/>
-            <a:r>
-              <a:rPr lang="en-US" dirty="0" smtClean="0"/>
-              <a:t>Delay is almost constant</a:t>
-            </a:r>
-            <a:endParaRPr lang="en-US" dirty="0"/>
-          </a:p>
-        </p:txBody>
-      </p:sp>
-      <p:sp>
-        <p:nvSpPr>
-          <p:cNvPr id="5" name="Slide Number Placeholder 4"/>
-          <p:cNvSpPr>
-            <a:spLocks noGrp="1"/>
-          </p:cNvSpPr>
-          <p:nvPr>
-            <p:ph type="sldNum" sz="quarter" idx="12"/>
-          </p:nvPr>
-        </p:nvSpPr>
-        <p:spPr/>
-        <p:txBody>
-          <a:bodyPr/>
-          <a:lstStyle/>
-          <a:p>
-            <a:fld id="{CF142645-850A-43A6-BF6E-75FA772F8DCF}" type="slidenum">
-              <a:rPr lang="en-US" smtClean="0"/>
-              <a:pPr/>
-              <a:t>29</a:t>
+              <a:t>31</a:t>
             </a:fld>
             <a:endParaRPr lang="en-US" dirty="0"/>
           </a:p>
@@ -21057,7 +22665,7 @@
 </p:sld>
 </file>
 
-<file path=ppt/slides/slide3.xml><?xml version="1.0" encoding="utf-8"?>
+<file path=ppt/slides/slide32.xml><?xml version="1.0" encoding="utf-8"?>
 <p:sld xmlns:a="http://schemas.openxmlformats.org/drawingml/2006/main" xmlns:r="http://schemas.openxmlformats.org/officeDocument/2006/relationships" xmlns:p="http://schemas.openxmlformats.org/presentationml/2006/main">
   <p:cSld>
     <p:spTree>
@@ -21091,266 +22699,6 @@
           <a:p>
             <a:r>
               <a:rPr lang="en-US" dirty="0" smtClean="0"/>
-              <a:t>Background of Our Study</a:t>
-            </a:r>
-            <a:endParaRPr lang="en-US" dirty="0"/>
-          </a:p>
-        </p:txBody>
-      </p:sp>
-      <p:sp>
-        <p:nvSpPr>
-          <p:cNvPr id="3" name="Content Placeholder 2"/>
-          <p:cNvSpPr>
-            <a:spLocks noGrp="1"/>
-          </p:cNvSpPr>
-          <p:nvPr>
-            <p:ph idx="1"/>
-          </p:nvPr>
-        </p:nvSpPr>
-        <p:spPr/>
-        <p:txBody>
-          <a:bodyPr/>
-          <a:lstStyle/>
-          <a:p>
-            <a:r>
-              <a:rPr lang="en-US" dirty="0" smtClean="0"/>
-              <a:t>How to increase the spectrum utilization?</a:t>
-            </a:r>
-            <a:endParaRPr lang="en-US" dirty="0"/>
-          </a:p>
-        </p:txBody>
-      </p:sp>
-      <p:pic>
-        <p:nvPicPr>
-          <p:cNvPr id="7" name="Picture 6" descr="crn-0.png"/>
-          <p:cNvPicPr>
-            <a:picLocks noChangeAspect="1"/>
-          </p:cNvPicPr>
-          <p:nvPr/>
-        </p:nvPicPr>
-        <p:blipFill>
-          <a:blip r:embed="rId2"/>
-          <a:stretch>
-            <a:fillRect/>
-          </a:stretch>
-        </p:blipFill>
-        <p:spPr>
-          <a:xfrm>
-            <a:off x="1879600" y="2667000"/>
-            <a:ext cx="5384800" cy="4038600"/>
-          </a:xfrm>
-          <a:prstGeom prst="rect">
-            <a:avLst/>
-          </a:prstGeom>
-        </p:spPr>
-      </p:pic>
-      <p:sp>
-        <p:nvSpPr>
-          <p:cNvPr id="5" name="Slide Number Placeholder 4"/>
-          <p:cNvSpPr>
-            <a:spLocks noGrp="1"/>
-          </p:cNvSpPr>
-          <p:nvPr>
-            <p:ph type="sldNum" sz="quarter" idx="12"/>
-          </p:nvPr>
-        </p:nvSpPr>
-        <p:spPr/>
-        <p:txBody>
-          <a:bodyPr/>
-          <a:lstStyle/>
-          <a:p>
-            <a:fld id="{CF142645-850A-43A6-BF6E-75FA772F8DCF}" type="slidenum">
-              <a:rPr lang="en-US" smtClean="0"/>
-              <a:pPr/>
-              <a:t>3</a:t>
-            </a:fld>
-            <a:endParaRPr lang="en-US" dirty="0"/>
-          </a:p>
-        </p:txBody>
-      </p:sp>
-      <p:pic>
-        <p:nvPicPr>
-          <p:cNvPr id="9" name="Picture 8" descr="pu.png"/>
-          <p:cNvPicPr>
-            <a:picLocks noChangeAspect="1"/>
-          </p:cNvPicPr>
-          <p:nvPr/>
-        </p:nvPicPr>
-        <p:blipFill>
-          <a:blip r:embed="rId3" cstate="print"/>
-          <a:srcRect l="34127" t="20370" r="32011" b="20370"/>
-          <a:stretch>
-            <a:fillRect/>
-          </a:stretch>
-        </p:blipFill>
-        <p:spPr>
-          <a:xfrm>
-            <a:off x="1981200" y="4073216"/>
-            <a:ext cx="533400" cy="700088"/>
-          </a:xfrm>
-          <a:prstGeom prst="rect">
-            <a:avLst/>
-          </a:prstGeom>
-        </p:spPr>
-      </p:pic>
-      <p:pic>
-        <p:nvPicPr>
-          <p:cNvPr id="10" name="Picture 9" descr="pu.png"/>
-          <p:cNvPicPr>
-            <a:picLocks noChangeAspect="1"/>
-          </p:cNvPicPr>
-          <p:nvPr/>
-        </p:nvPicPr>
-        <p:blipFill>
-          <a:blip r:embed="rId3" cstate="print"/>
-          <a:srcRect l="34127" t="20370" r="32011" b="20370"/>
-          <a:stretch>
-            <a:fillRect/>
-          </a:stretch>
-        </p:blipFill>
-        <p:spPr>
-          <a:xfrm>
-            <a:off x="1445528" y="4079544"/>
-            <a:ext cx="533400" cy="700088"/>
-          </a:xfrm>
-          <a:prstGeom prst="rect">
-            <a:avLst/>
-          </a:prstGeom>
-        </p:spPr>
-      </p:pic>
-    </p:spTree>
-  </p:cSld>
-  <p:clrMapOvr>
-    <a:masterClrMapping/>
-  </p:clrMapOvr>
-  <p:timing>
-    <p:tnLst>
-      <p:par>
-        <p:cTn id="1" dur="indefinite" restart="never" nodeType="tmRoot">
-          <p:childTnLst>
-            <p:seq concurrent="1" nextAc="seek">
-              <p:cTn id="2" dur="indefinite" nodeType="mainSeq">
-                <p:childTnLst>
-                  <p:par>
-                    <p:cTn id="3" fill="hold">
-                      <p:stCondLst>
-                        <p:cond delay="indefinite"/>
-                      </p:stCondLst>
-                      <p:childTnLst>
-                        <p:par>
-                          <p:cTn id="4" fill="hold">
-                            <p:stCondLst>
-                              <p:cond delay="0"/>
-                            </p:stCondLst>
-                            <p:childTnLst>
-                              <p:par>
-                                <p:cTn id="5" presetID="0" presetClass="path" presetSubtype="0" accel="50000" decel="50000" fill="hold" nodeType="clickEffect">
-                                  <p:stCondLst>
-                                    <p:cond delay="0"/>
-                                  </p:stCondLst>
-                                  <p:childTnLst>
-                                    <p:animMotion origin="layout" path="M 0.0375 -0.01156 L 0.4375 -0.18918 " pathEditMode="relative" ptsTypes="AA">
-                                      <p:cBhvr>
-                                        <p:cTn id="6" dur="2000" fill="hold"/>
-                                        <p:tgtEl>
-                                          <p:spTgt spid="9"/>
-                                        </p:tgtEl>
-                                        <p:attrNameLst>
-                                          <p:attrName>ppt_x</p:attrName>
-                                          <p:attrName>ppt_y</p:attrName>
-                                        </p:attrNameLst>
-                                      </p:cBhvr>
-                                    </p:animMotion>
-                                  </p:childTnLst>
-                                </p:cTn>
-                              </p:par>
-                              <p:par>
-                                <p:cTn id="7" presetID="0" presetClass="path" presetSubtype="0" accel="50000" decel="50000" fill="hold" nodeType="withEffect">
-                                  <p:stCondLst>
-                                    <p:cond delay="0"/>
-                                  </p:stCondLst>
-                                  <p:childTnLst>
-                                    <p:animMotion origin="layout" path="M 3.61111E-6 4.10731E-6 L 0.496 0.18732 " pathEditMode="relative" rAng="0" ptsTypes="AA">
-                                      <p:cBhvr>
-                                        <p:cTn id="8" dur="2000" fill="hold"/>
-                                        <p:tgtEl>
-                                          <p:spTgt spid="10"/>
-                                        </p:tgtEl>
-                                        <p:attrNameLst>
-                                          <p:attrName>ppt_x</p:attrName>
-                                          <p:attrName>ppt_y</p:attrName>
-                                        </p:attrNameLst>
-                                      </p:cBhvr>
-                                      <p:rCtr x="24800" y="9400"/>
-                                    </p:animMotion>
-                                  </p:childTnLst>
-                                </p:cTn>
-                              </p:par>
-                            </p:childTnLst>
-                          </p:cTn>
-                        </p:par>
-                      </p:childTnLst>
-                    </p:cTn>
-                  </p:par>
-                </p:childTnLst>
-              </p:cTn>
-              <p:prevCondLst>
-                <p:cond evt="onPrev" delay="0">
-                  <p:tgtEl>
-                    <p:sldTgt/>
-                  </p:tgtEl>
-                </p:cond>
-              </p:prevCondLst>
-              <p:nextCondLst>
-                <p:cond evt="onNext" delay="0">
-                  <p:tgtEl>
-                    <p:sldTgt/>
-                  </p:tgtEl>
-                </p:cond>
-              </p:nextCondLst>
-            </p:seq>
-          </p:childTnLst>
-        </p:cTn>
-      </p:par>
-    </p:tnLst>
-  </p:timing>
-</p:sld>
-</file>
-
-<file path=ppt/slides/slide30.xml><?xml version="1.0" encoding="utf-8"?>
-<p:sld xmlns:a="http://schemas.openxmlformats.org/drawingml/2006/main" xmlns:r="http://schemas.openxmlformats.org/officeDocument/2006/relationships" xmlns:p="http://schemas.openxmlformats.org/presentationml/2006/main">
-  <p:cSld>
-    <p:spTree>
-      <p:nvGrpSpPr>
-        <p:cNvPr id="1" name=""/>
-        <p:cNvGrpSpPr/>
-        <p:nvPr/>
-      </p:nvGrpSpPr>
-      <p:grpSpPr>
-        <a:xfrm>
-          <a:off x="0" y="0"/>
-          <a:ext cx="0" cy="0"/>
-          <a:chOff x="0" y="0"/>
-          <a:chExt cx="0" cy="0"/>
-        </a:xfrm>
-      </p:grpSpPr>
-      <p:sp>
-        <p:nvSpPr>
-          <p:cNvPr id="2" name="Title 1"/>
-          <p:cNvSpPr>
-            <a:spLocks noGrp="1"/>
-          </p:cNvSpPr>
-          <p:nvPr>
-            <p:ph type="title"/>
-          </p:nvPr>
-        </p:nvSpPr>
-        <p:spPr/>
-        <p:txBody>
-          <a:bodyPr/>
-          <a:lstStyle/>
-          <a:p>
-            <a:r>
-              <a:rPr lang="en-US" dirty="0" smtClean="0"/>
               <a:t>Conclusion</a:t>
             </a:r>
             <a:endParaRPr lang="en-US" dirty="0"/>
@@ -21383,45 +22731,21 @@
             <a:pPr lvl="1"/>
             <a:r>
               <a:rPr lang="en-US" dirty="0" smtClean="0"/>
-              <a:t>We </a:t>
-            </a:r>
+              <a:t>We proposed a feedback-based multi-radio exploitation approach to solve the problem.</a:t>
+            </a:r>
+          </a:p>
+          <a:p>
+            <a:pPr lvl="1"/>
             <a:r>
               <a:rPr lang="en-US" dirty="0" smtClean="0"/>
-              <a:t>proposed </a:t>
-            </a:r>
+              <a:t>We evaluated the performance of our proposed approach through experimentation.</a:t>
+            </a:r>
+          </a:p>
+          <a:p>
+            <a:pPr lvl="1"/>
             <a:r>
               <a:rPr lang="en-US" dirty="0" smtClean="0"/>
-              <a:t>a feedback-based multi-radio exploitation approach to solve the problem.</a:t>
-            </a:r>
-          </a:p>
-          <a:p>
-            <a:pPr lvl="1"/>
-            <a:r>
-              <a:rPr lang="en-US" dirty="0" smtClean="0"/>
-              <a:t>We </a:t>
-            </a:r>
-            <a:r>
-              <a:rPr lang="en-US" dirty="0" smtClean="0"/>
-              <a:t>evaluated </a:t>
-            </a:r>
-            <a:r>
-              <a:rPr lang="en-US" dirty="0" smtClean="0"/>
-              <a:t>the performance of our proposed approach through experimentation.</a:t>
-            </a:r>
-          </a:p>
-          <a:p>
-            <a:pPr lvl="1"/>
-            <a:r>
-              <a:rPr lang="en-US" dirty="0" smtClean="0"/>
-              <a:t>We </a:t>
-            </a:r>
-            <a:r>
-              <a:rPr lang="en-US" dirty="0" smtClean="0"/>
-              <a:t>compared </a:t>
-            </a:r>
-            <a:r>
-              <a:rPr lang="en-US" dirty="0" smtClean="0"/>
-              <a:t>the performance of our proposed approach with that of other contemporary approaches.</a:t>
+              <a:t>We compared the performance of our proposed approach with that of other contemporary approaches.</a:t>
             </a:r>
             <a:endParaRPr lang="en-US" dirty="0"/>
           </a:p>
@@ -21445,7 +22769,7 @@
             <a:fld id="{CF142645-850A-43A6-BF6E-75FA772F8DCF}" type="slidenum">
               <a:rPr lang="en-US" smtClean="0"/>
               <a:pPr/>
-              <a:t>30</a:t>
+              <a:t>32</a:t>
             </a:fld>
             <a:endParaRPr lang="en-US" dirty="0"/>
           </a:p>
@@ -21466,7 +22790,7 @@
 </p:sld>
 </file>
 
-<file path=ppt/slides/slide31.xml><?xml version="1.0" encoding="utf-8"?>
+<file path=ppt/slides/slide33.xml><?xml version="1.0" encoding="utf-8"?>
 <p:sld xmlns:a="http://schemas.openxmlformats.org/drawingml/2006/main" xmlns:r="http://schemas.openxmlformats.org/officeDocument/2006/relationships" xmlns:p="http://schemas.openxmlformats.org/presentationml/2006/main">
   <p:cSld>
     <p:spTree>
@@ -21532,7 +22856,7 @@
             <a:fld id="{CF142645-850A-43A6-BF6E-75FA772F8DCF}" type="slidenum">
               <a:rPr lang="en-US" smtClean="0"/>
               <a:pPr/>
-              <a:t>31</a:t>
+              <a:t>33</a:t>
             </a:fld>
             <a:endParaRPr lang="en-US" dirty="0"/>
           </a:p>
@@ -21553,7 +22877,7 @@
 </p:sld>
 </file>
 
-<file path=ppt/slides/slide32.xml><?xml version="1.0" encoding="utf-8"?>
+<file path=ppt/slides/slide34.xml><?xml version="1.0" encoding="utf-8"?>
 <p:sld xmlns:a="http://schemas.openxmlformats.org/drawingml/2006/main" xmlns:r="http://schemas.openxmlformats.org/officeDocument/2006/relationships" xmlns:p="http://schemas.openxmlformats.org/presentationml/2006/main">
   <p:cSld>
     <p:spTree>
@@ -21929,7 +23253,7 @@
             <a:fld id="{CF142645-850A-43A6-BF6E-75FA772F8DCF}" type="slidenum">
               <a:rPr lang="en-US" smtClean="0"/>
               <a:pPr/>
-              <a:t>32</a:t>
+              <a:t>34</a:t>
             </a:fld>
             <a:endParaRPr lang="en-US" dirty="0"/>
           </a:p>
@@ -21950,7 +23274,7 @@
 </p:sld>
 </file>
 
-<file path=ppt/slides/slide33.xml><?xml version="1.0" encoding="utf-8"?>
+<file path=ppt/slides/slide35.xml><?xml version="1.0" encoding="utf-8"?>
 <p:sld xmlns:a="http://schemas.openxmlformats.org/drawingml/2006/main" xmlns:r="http://schemas.openxmlformats.org/officeDocument/2006/relationships" xmlns:p="http://schemas.openxmlformats.org/presentationml/2006/main">
   <p:cSld>
     <p:spTree>
@@ -22176,7 +23500,7 @@
             <a:fld id="{CF142645-850A-43A6-BF6E-75FA772F8DCF}" type="slidenum">
               <a:rPr lang="en-US" smtClean="0"/>
               <a:pPr/>
-              <a:t>33</a:t>
+              <a:t>35</a:t>
             </a:fld>
             <a:endParaRPr lang="en-US" dirty="0"/>
           </a:p>

</xml_diff>

<commit_message>
The related work pictures are not yet added.
</commit_message>
<xml_diff>
--- a/draft.pptx
+++ b/draft.pptx
@@ -29,14 +29,14 @@
     <p:sldId id="327" r:id="rId20"/>
     <p:sldId id="329" r:id="rId21"/>
     <p:sldId id="323" r:id="rId22"/>
-    <p:sldId id="291" r:id="rId23"/>
+    <p:sldId id="343" r:id="rId23"/>
     <p:sldId id="292" r:id="rId24"/>
-    <p:sldId id="330" r:id="rId25"/>
-    <p:sldId id="333" r:id="rId26"/>
-    <p:sldId id="331" r:id="rId27"/>
-    <p:sldId id="334" r:id="rId28"/>
-    <p:sldId id="335" r:id="rId29"/>
-    <p:sldId id="332" r:id="rId30"/>
+    <p:sldId id="344" r:id="rId25"/>
+    <p:sldId id="330" r:id="rId26"/>
+    <p:sldId id="333" r:id="rId27"/>
+    <p:sldId id="331" r:id="rId28"/>
+    <p:sldId id="334" r:id="rId29"/>
+    <p:sldId id="335" r:id="rId30"/>
     <p:sldId id="308" r:id="rId31"/>
     <p:sldId id="311" r:id="rId32"/>
     <p:sldId id="313" r:id="rId33"/>
@@ -547,11 +547,11 @@
           <a:lstStyle/>
           <a:p>
             <a:r>
-              <a:rPr lang="en-US" dirty="0" smtClean="0"/>
+              <a:rPr lang="en-US" smtClean="0"/>
               <a:t>Hi, I am Tanvir Ahmed</a:t>
             </a:r>
             <a:r>
-              <a:rPr lang="en-US" baseline="0" dirty="0" smtClean="0"/>
+              <a:rPr lang="en-US" baseline="0" smtClean="0"/>
               <a:t> Khan. Traditional Spectrum Management System is largely underutilized and CRNs improves this utilization. However, employing multiple radios on CRNs degrades the throughput. Today I will show you an approach to overcome this throughput degradation.</a:t>
             </a:r>
             <a:endParaRPr lang="en-US" dirty="0"/>
@@ -1146,6 +1146,91 @@
 </file>
 
 <file path=ppt/notesSlides/notesSlide8.xml><?xml version="1.0" encoding="utf-8"?>
+<p:notes xmlns:a="http://schemas.openxmlformats.org/drawingml/2006/main" xmlns:r="http://schemas.openxmlformats.org/officeDocument/2006/relationships" xmlns:p="http://schemas.openxmlformats.org/presentationml/2006/main">
+  <p:cSld>
+    <p:spTree>
+      <p:nvGrpSpPr>
+        <p:cNvPr id="1" name=""/>
+        <p:cNvGrpSpPr/>
+        <p:nvPr/>
+      </p:nvGrpSpPr>
+      <p:grpSpPr>
+        <a:xfrm>
+          <a:off x="0" y="0"/>
+          <a:ext cx="0" cy="0"/>
+          <a:chOff x="0" y="0"/>
+          <a:chExt cx="0" cy="0"/>
+        </a:xfrm>
+      </p:grpSpPr>
+      <p:sp>
+        <p:nvSpPr>
+          <p:cNvPr id="2" name="Slide Image Placeholder 1"/>
+          <p:cNvSpPr>
+            <a:spLocks noGrp="1" noRot="1" noChangeAspect="1"/>
+          </p:cNvSpPr>
+          <p:nvPr>
+            <p:ph type="sldImg"/>
+          </p:nvPr>
+        </p:nvSpPr>
+        <p:spPr/>
+      </p:sp>
+      <p:sp>
+        <p:nvSpPr>
+          <p:cNvPr id="3" name="Notes Placeholder 2"/>
+          <p:cNvSpPr>
+            <a:spLocks noGrp="1"/>
+          </p:cNvSpPr>
+          <p:nvPr>
+            <p:ph type="body" idx="1"/>
+          </p:nvPr>
+        </p:nvSpPr>
+        <p:spPr/>
+        <p:txBody>
+          <a:bodyPr/>
+          <a:lstStyle/>
+          <a:p>
+            <a:endParaRPr lang="en-US" dirty="0"/>
+          </a:p>
+        </p:txBody>
+      </p:sp>
+      <p:sp>
+        <p:nvSpPr>
+          <p:cNvPr id="4" name="Slide Number Placeholder 3"/>
+          <p:cNvSpPr>
+            <a:spLocks noGrp="1"/>
+          </p:cNvSpPr>
+          <p:nvPr>
+            <p:ph type="sldNum" sz="quarter" idx="10"/>
+          </p:nvPr>
+        </p:nvSpPr>
+        <p:spPr/>
+        <p:txBody>
+          <a:bodyPr/>
+          <a:lstStyle/>
+          <a:p>
+            <a:fld id="{AF75187D-DC40-47E2-B446-AC348038ABC4}" type="slidenum">
+              <a:rPr lang="en-US" smtClean="0"/>
+              <a:pPr/>
+              <a:t>8</a:t>
+            </a:fld>
+            <a:endParaRPr lang="en-US"/>
+          </a:p>
+        </p:txBody>
+      </p:sp>
+    </p:spTree>
+    <p:extLst>
+      <p:ext uri="{BB962C8B-B14F-4D97-AF65-F5344CB8AC3E}">
+        <p14:creationId xmlns:p14="http://schemas.microsoft.com/office/powerpoint/2010/main" val="1394752973"/>
+      </p:ext>
+    </p:extLst>
+  </p:cSld>
+  <p:clrMapOvr>
+    <a:masterClrMapping/>
+  </p:clrMapOvr>
+</p:notes>
+</file>
+
+<file path=ppt/notesSlides/notesSlide9.xml><?xml version="1.0" encoding="utf-8"?>
 <p:notes xmlns:a="http://schemas.openxmlformats.org/drawingml/2006/main" xmlns:r="http://schemas.openxmlformats.org/officeDocument/2006/relationships" xmlns:p="http://schemas.openxmlformats.org/presentationml/2006/main">
   <p:cSld>
     <p:spTree>
@@ -9873,7 +9958,11 @@
           <a:p>
             <a:r>
               <a:rPr lang="en-US" dirty="0" smtClean="0"/>
-              <a:t>Our research problem</a:t>
+              <a:t>research </a:t>
+            </a:r>
+            <a:r>
+              <a:rPr lang="en-US" dirty="0" smtClean="0"/>
+              <a:t>problem</a:t>
             </a:r>
             <a:endParaRPr lang="en-US" dirty="0"/>
           </a:p>
@@ -10100,6 +10189,274 @@
         </p:nvSpPr>
         <p:spPr/>
         <p:txBody>
+          <a:bodyPr/>
+          <a:lstStyle/>
+          <a:p>
+            <a:r>
+              <a:rPr lang="en-US" dirty="0" smtClean="0"/>
+              <a:t>Proposed Methodology</a:t>
+            </a:r>
+            <a:endParaRPr lang="en-US" dirty="0"/>
+          </a:p>
+        </p:txBody>
+      </p:sp>
+      <p:sp>
+        <p:nvSpPr>
+          <p:cNvPr id="3" name="Text Placeholder 2"/>
+          <p:cNvSpPr>
+            <a:spLocks noGrp="1"/>
+          </p:cNvSpPr>
+          <p:nvPr>
+            <p:ph type="body" idx="1"/>
+          </p:nvPr>
+        </p:nvSpPr>
+        <p:spPr/>
+        <p:txBody>
+          <a:bodyPr/>
+          <a:lstStyle/>
+          <a:p>
+            <a:endParaRPr lang="en-US"/>
+          </a:p>
+        </p:txBody>
+      </p:sp>
+      <p:sp>
+        <p:nvSpPr>
+          <p:cNvPr id="4" name="Slide Number Placeholder 3"/>
+          <p:cNvSpPr>
+            <a:spLocks noGrp="1"/>
+          </p:cNvSpPr>
+          <p:nvPr>
+            <p:ph type="sldNum" sz="quarter" idx="12"/>
+          </p:nvPr>
+        </p:nvSpPr>
+        <p:spPr/>
+        <p:txBody>
+          <a:bodyPr/>
+          <a:lstStyle/>
+          <a:p>
+            <a:fld id="{CF142645-850A-43A6-BF6E-75FA772F8DCF}" type="slidenum">
+              <a:rPr lang="en-US" smtClean="0"/>
+              <a:pPr/>
+              <a:t>22</a:t>
+            </a:fld>
+            <a:endParaRPr lang="en-US" dirty="0"/>
+          </a:p>
+        </p:txBody>
+      </p:sp>
+    </p:spTree>
+    <p:extLst>
+      <p:ext uri="{BB962C8B-B14F-4D97-AF65-F5344CB8AC3E}">
+        <p14:creationId xmlns:p14="http://schemas.microsoft.com/office/powerpoint/2010/main" val="808015093"/>
+      </p:ext>
+    </p:extLst>
+  </p:cSld>
+  <p:clrMapOvr>
+    <a:masterClrMapping/>
+  </p:clrMapOvr>
+  <p:timing>
+    <p:tnLst>
+      <p:par>
+        <p:cTn id="1" dur="indefinite" restart="never" nodeType="tmRoot"/>
+      </p:par>
+    </p:tnLst>
+  </p:timing>
+</p:sld>
+</file>
+
+<file path=ppt/slides/slide23.xml><?xml version="1.0" encoding="utf-8"?>
+<p:sld xmlns:a="http://schemas.openxmlformats.org/drawingml/2006/main" xmlns:r="http://schemas.openxmlformats.org/officeDocument/2006/relationships" xmlns:p="http://schemas.openxmlformats.org/presentationml/2006/main">
+  <p:cSld>
+    <p:spTree>
+      <p:nvGrpSpPr>
+        <p:cNvPr id="1" name=""/>
+        <p:cNvGrpSpPr/>
+        <p:nvPr/>
+      </p:nvGrpSpPr>
+      <p:grpSpPr>
+        <a:xfrm>
+          <a:off x="0" y="0"/>
+          <a:ext cx="0" cy="0"/>
+          <a:chOff x="0" y="0"/>
+          <a:chExt cx="0" cy="0"/>
+        </a:xfrm>
+      </p:grpSpPr>
+      <p:sp>
+        <p:nvSpPr>
+          <p:cNvPr id="2" name="Title 1"/>
+          <p:cNvSpPr>
+            <a:spLocks noGrp="1"/>
+          </p:cNvSpPr>
+          <p:nvPr>
+            <p:ph type="title"/>
+          </p:nvPr>
+        </p:nvSpPr>
+        <p:spPr/>
+        <p:txBody>
+          <a:bodyPr>
+            <a:normAutofit fontScale="90000"/>
+          </a:bodyPr>
+          <a:lstStyle/>
+          <a:p>
+            <a:r>
+              <a:rPr lang="en-US" dirty="0" smtClean="0"/>
+              <a:t>Steps in Our </a:t>
+            </a:r>
+            <a:r>
+              <a:rPr lang="en-US" dirty="0"/>
+              <a:t>Proposed </a:t>
+            </a:r>
+            <a:r>
+              <a:rPr lang="en-US" dirty="0" smtClean="0"/>
+              <a:t>Methodology</a:t>
+            </a:r>
+            <a:endParaRPr lang="en-US" dirty="0"/>
+          </a:p>
+        </p:txBody>
+      </p:sp>
+      <p:sp>
+        <p:nvSpPr>
+          <p:cNvPr id="3132" name="AutoShape 60"/>
+          <p:cNvSpPr>
+            <a:spLocks noChangeAspect="1" noChangeArrowheads="1" noTextEdit="1"/>
+          </p:cNvSpPr>
+          <p:nvPr/>
+        </p:nvSpPr>
+        <p:spPr bwMode="auto">
+          <a:xfrm>
+            <a:off x="5114925" y="4891088"/>
+            <a:ext cx="3571875" cy="1600200"/>
+          </a:xfrm>
+          <a:prstGeom prst="rect">
+            <a:avLst/>
+          </a:prstGeom>
+          <a:noFill/>
+          <a:ln w="9525">
+            <a:noFill/>
+            <a:miter lim="800000"/>
+            <a:headEnd/>
+            <a:tailEnd/>
+          </a:ln>
+        </p:spPr>
+        <p:txBody>
+          <a:bodyPr vert="horz" wrap="square" lIns="91440" tIns="45720" rIns="91440" bIns="45720" numCol="1" anchor="t" anchorCtr="0" compatLnSpc="1">
+            <a:prstTxWarp prst="textNoShape">
+              <a:avLst/>
+            </a:prstTxWarp>
+          </a:bodyPr>
+          <a:lstStyle/>
+          <a:p>
+            <a:endParaRPr lang="en-US"/>
+          </a:p>
+        </p:txBody>
+      </p:sp>
+      <p:pic>
+        <p:nvPicPr>
+          <p:cNvPr id="3074" name="Picture 2"/>
+          <p:cNvPicPr>
+            <a:picLocks noChangeAspect="1" noChangeArrowheads="1"/>
+          </p:cNvPicPr>
+          <p:nvPr/>
+        </p:nvPicPr>
+        <p:blipFill>
+          <a:blip r:embed="rId2" cstate="print">
+            <a:extLst>
+              <a:ext uri="{28A0092B-C50C-407E-A947-70E740481C1C}">
+                <a14:useLocalDpi xmlns:a14="http://schemas.microsoft.com/office/drawing/2010/main" val="0"/>
+              </a:ext>
+            </a:extLst>
+          </a:blip>
+          <a:srcRect/>
+          <a:stretch>
+            <a:fillRect/>
+          </a:stretch>
+        </p:blipFill>
+        <p:spPr bwMode="auto">
+          <a:xfrm>
+            <a:off x="2099830" y="1361209"/>
+            <a:ext cx="4944341" cy="5420591"/>
+          </a:xfrm>
+          <a:prstGeom prst="rect">
+            <a:avLst/>
+          </a:prstGeom>
+          <a:noFill/>
+          <a:ln>
+            <a:noFill/>
+          </a:ln>
+          <a:effectLst/>
+          <a:extLst>
+            <a:ext uri="{909E8E84-426E-40DD-AFC4-6F175D3DCCD1}">
+              <a14:hiddenFill xmlns:a14="http://schemas.microsoft.com/office/drawing/2010/main">
+                <a:solidFill>
+                  <a:schemeClr val="accent1"/>
+                </a:solidFill>
+              </a14:hiddenFill>
+            </a:ext>
+            <a:ext uri="{91240B29-F687-4F45-9708-019B960494DF}">
+              <a14:hiddenLine xmlns:a14="http://schemas.microsoft.com/office/drawing/2010/main" w="9525">
+                <a:solidFill>
+                  <a:schemeClr val="tx1"/>
+                </a:solidFill>
+                <a:miter lim="800000"/>
+                <a:headEnd/>
+                <a:tailEnd/>
+              </a14:hiddenLine>
+            </a:ext>
+            <a:ext uri="{AF507438-7753-43E0-B8FC-AC1667EBCBE1}">
+              <a14:hiddenEffects xmlns:a14="http://schemas.microsoft.com/office/drawing/2010/main">
+                <a:effectLst>
+                  <a:outerShdw dist="35921" dir="2700000" algn="ctr" rotWithShape="0">
+                    <a:schemeClr val="bg2"/>
+                  </a:outerShdw>
+                </a:effectLst>
+              </a14:hiddenEffects>
+            </a:ext>
+          </a:extLst>
+        </p:spPr>
+      </p:pic>
+    </p:spTree>
+  </p:cSld>
+  <p:clrMapOvr>
+    <a:masterClrMapping/>
+  </p:clrMapOvr>
+  <p:timing>
+    <p:tnLst>
+      <p:par>
+        <p:cTn id="1" dur="indefinite" restart="never" nodeType="tmRoot"/>
+      </p:par>
+    </p:tnLst>
+  </p:timing>
+</p:sld>
+</file>
+
+<file path=ppt/slides/slide24.xml><?xml version="1.0" encoding="utf-8"?>
+<p:sld xmlns:a="http://schemas.openxmlformats.org/drawingml/2006/main" xmlns:r="http://schemas.openxmlformats.org/officeDocument/2006/relationships" xmlns:p="http://schemas.openxmlformats.org/presentationml/2006/main">
+  <p:cSld>
+    <p:spTree>
+      <p:nvGrpSpPr>
+        <p:cNvPr id="1" name=""/>
+        <p:cNvGrpSpPr/>
+        <p:nvPr/>
+      </p:nvGrpSpPr>
+      <p:grpSpPr>
+        <a:xfrm>
+          <a:off x="0" y="0"/>
+          <a:ext cx="0" cy="0"/>
+          <a:chOff x="0" y="0"/>
+          <a:chExt cx="0" cy="0"/>
+        </a:xfrm>
+      </p:grpSpPr>
+      <p:sp>
+        <p:nvSpPr>
+          <p:cNvPr id="2" name="Title 1"/>
+          <p:cNvSpPr>
+            <a:spLocks noGrp="1"/>
+          </p:cNvSpPr>
+          <p:nvPr>
+            <p:ph type="title"/>
+          </p:nvPr>
+        </p:nvSpPr>
+        <p:spPr/>
+        <p:txBody>
           <a:bodyPr>
             <a:normAutofit fontScale="90000"/>
           </a:bodyPr>
@@ -10160,13 +10517,18 @@
             <a:fld id="{CF142645-850A-43A6-BF6E-75FA772F8DCF}" type="slidenum">
               <a:rPr lang="en-US" smtClean="0"/>
               <a:pPr/>
-              <a:t>22</a:t>
+              <a:t>24</a:t>
             </a:fld>
             <a:endParaRPr lang="en-US" dirty="0"/>
           </a:p>
         </p:txBody>
       </p:sp>
     </p:spTree>
+    <p:extLst>
+      <p:ext uri="{BB962C8B-B14F-4D97-AF65-F5344CB8AC3E}">
+        <p14:creationId xmlns:p14="http://schemas.microsoft.com/office/powerpoint/2010/main" val="1403830415"/>
+      </p:ext>
+    </p:extLst>
   </p:cSld>
   <p:clrMapOvr>
     <a:masterClrMapping/>
@@ -10260,172 +10622,7 @@
 </p:sld>
 </file>
 
-<file path=ppt/slides/slide23.xml><?xml version="1.0" encoding="utf-8"?>
-<p:sld xmlns:a="http://schemas.openxmlformats.org/drawingml/2006/main" xmlns:r="http://schemas.openxmlformats.org/officeDocument/2006/relationships" xmlns:p="http://schemas.openxmlformats.org/presentationml/2006/main">
-  <p:cSld>
-    <p:spTree>
-      <p:nvGrpSpPr>
-        <p:cNvPr id="1" name=""/>
-        <p:cNvGrpSpPr/>
-        <p:nvPr/>
-      </p:nvGrpSpPr>
-      <p:grpSpPr>
-        <a:xfrm>
-          <a:off x="0" y="0"/>
-          <a:ext cx="0" cy="0"/>
-          <a:chOff x="0" y="0"/>
-          <a:chExt cx="0" cy="0"/>
-        </a:xfrm>
-      </p:grpSpPr>
-      <p:sp>
-        <p:nvSpPr>
-          <p:cNvPr id="2" name="Title 1"/>
-          <p:cNvSpPr>
-            <a:spLocks noGrp="1"/>
-          </p:cNvSpPr>
-          <p:nvPr>
-            <p:ph type="title"/>
-          </p:nvPr>
-        </p:nvSpPr>
-        <p:spPr/>
-        <p:txBody>
-          <a:bodyPr>
-            <a:normAutofit fontScale="90000"/>
-          </a:bodyPr>
-          <a:lstStyle/>
-          <a:p>
-            <a:r>
-              <a:rPr lang="en-US" dirty="0" smtClean="0"/>
-              <a:t>Steps in Our </a:t>
-            </a:r>
-            <a:r>
-              <a:rPr lang="en-US" dirty="0"/>
-              <a:t>Proposed </a:t>
-            </a:r>
-            <a:r>
-              <a:rPr lang="en-US" dirty="0" smtClean="0"/>
-              <a:t>Methodology</a:t>
-            </a:r>
-            <a:endParaRPr lang="en-US" dirty="0"/>
-          </a:p>
-        </p:txBody>
-      </p:sp>
-      <p:sp>
-        <p:nvSpPr>
-          <p:cNvPr id="3132" name="AutoShape 60"/>
-          <p:cNvSpPr>
-            <a:spLocks noChangeAspect="1" noChangeArrowheads="1" noTextEdit="1"/>
-          </p:cNvSpPr>
-          <p:nvPr/>
-        </p:nvSpPr>
-        <p:spPr bwMode="auto">
-          <a:xfrm>
-            <a:off x="5114925" y="4891088"/>
-            <a:ext cx="3571875" cy="1600200"/>
-          </a:xfrm>
-          <a:prstGeom prst="rect">
-            <a:avLst/>
-          </a:prstGeom>
-          <a:noFill/>
-          <a:ln w="9525">
-            <a:noFill/>
-            <a:miter lim="800000"/>
-            <a:headEnd/>
-            <a:tailEnd/>
-          </a:ln>
-        </p:spPr>
-        <p:txBody>
-          <a:bodyPr vert="horz" wrap="square" lIns="91440" tIns="45720" rIns="91440" bIns="45720" numCol="1" anchor="t" anchorCtr="0" compatLnSpc="1">
-            <a:prstTxWarp prst="textNoShape">
-              <a:avLst/>
-            </a:prstTxWarp>
-          </a:bodyPr>
-          <a:lstStyle/>
-          <a:p>
-            <a:endParaRPr lang="en-US"/>
-          </a:p>
-        </p:txBody>
-      </p:sp>
-      <p:pic>
-        <p:nvPicPr>
-          <p:cNvPr id="3074" name="Picture 2"/>
-          <p:cNvPicPr>
-            <a:picLocks noChangeAspect="1" noChangeArrowheads="1"/>
-          </p:cNvPicPr>
-          <p:nvPr/>
-        </p:nvPicPr>
-        <p:blipFill>
-          <a:blip r:embed="rId2" cstate="print">
-            <a:extLst>
-              <a:ext uri="{28A0092B-C50C-407E-A947-70E740481C1C}">
-                <a14:useLocalDpi xmlns:a14="http://schemas.microsoft.com/office/drawing/2010/main" val="0"/>
-              </a:ext>
-            </a:extLst>
-          </a:blip>
-          <a:srcRect/>
-          <a:stretch>
-            <a:fillRect/>
-          </a:stretch>
-        </p:blipFill>
-        <p:spPr bwMode="auto">
-          <a:xfrm>
-            <a:off x="2099830" y="1361209"/>
-            <a:ext cx="4944341" cy="5420591"/>
-          </a:xfrm>
-          <a:prstGeom prst="rect">
-            <a:avLst/>
-          </a:prstGeom>
-          <a:noFill/>
-          <a:ln>
-            <a:noFill/>
-          </a:ln>
-          <a:effectLst/>
-          <a:extLst>
-            <a:ext uri="{909E8E84-426E-40DD-AFC4-6F175D3DCCD1}">
-              <a14:hiddenFill xmlns:a14="http://schemas.microsoft.com/office/drawing/2010/main">
-                <a:solidFill>
-                  <a:schemeClr val="accent1"/>
-                </a:solidFill>
-              </a14:hiddenFill>
-            </a:ext>
-            <a:ext uri="{91240B29-F687-4F45-9708-019B960494DF}">
-              <a14:hiddenLine xmlns:a14="http://schemas.microsoft.com/office/drawing/2010/main" w="9525">
-                <a:solidFill>
-                  <a:schemeClr val="tx1"/>
-                </a:solidFill>
-                <a:miter lim="800000"/>
-                <a:headEnd/>
-                <a:tailEnd/>
-              </a14:hiddenLine>
-            </a:ext>
-            <a:ext uri="{AF507438-7753-43E0-B8FC-AC1667EBCBE1}">
-              <a14:hiddenEffects xmlns:a14="http://schemas.microsoft.com/office/drawing/2010/main">
-                <a:effectLst>
-                  <a:outerShdw dist="35921" dir="2700000" algn="ctr" rotWithShape="0">
-                    <a:schemeClr val="bg2"/>
-                  </a:outerShdw>
-                </a:effectLst>
-              </a14:hiddenEffects>
-            </a:ext>
-          </a:extLst>
-        </p:spPr>
-      </p:pic>
-    </p:spTree>
-  </p:cSld>
-  <p:clrMapOvr>
-    <a:masterClrMapping/>
-  </p:clrMapOvr>
-  <p:timing>
-    <p:tnLst>
-      <p:par>
-        <p:cTn id="1" dur="indefinite" restart="never" nodeType="tmRoot"/>
-      </p:par>
-    </p:tnLst>
-  </p:timing>
-</p:sld>
-</file>
-
-<file path=ppt/slides/slide24.xml><?xml version="1.0" encoding="utf-8"?>
+<file path=ppt/slides/slide25.xml><?xml version="1.0" encoding="utf-8"?>
 <p:sld xmlns:a="http://schemas.openxmlformats.org/drawingml/2006/main" xmlns:r="http://schemas.openxmlformats.org/officeDocument/2006/relationships" xmlns:p="http://schemas.openxmlformats.org/presentationml/2006/main">
   <p:cSld>
     <p:spTree>
@@ -13743,7 +13940,7 @@
             <a:fld id="{CF142645-850A-43A6-BF6E-75FA772F8DCF}" type="slidenum">
               <a:rPr lang="en-US" smtClean="0"/>
               <a:pPr/>
-              <a:t>24</a:t>
+              <a:t>25</a:t>
             </a:fld>
             <a:endParaRPr lang="en-US" dirty="0"/>
           </a:p>
@@ -14887,7 +15084,7 @@
 </p:sld>
 </file>
 
-<file path=ppt/slides/slide25.xml><?xml version="1.0" encoding="utf-8"?>
+<file path=ppt/slides/slide26.xml><?xml version="1.0" encoding="utf-8"?>
 <p:sld xmlns:a="http://schemas.openxmlformats.org/drawingml/2006/main" xmlns:r="http://schemas.openxmlformats.org/officeDocument/2006/relationships" xmlns:p="http://schemas.openxmlformats.org/presentationml/2006/main">
   <p:cSld>
     <p:spTree>
@@ -15190,7 +15387,7 @@
             <a:fld id="{CF142645-850A-43A6-BF6E-75FA772F8DCF}" type="slidenum">
               <a:rPr lang="en-US" smtClean="0"/>
               <a:pPr/>
-              <a:t>25</a:t>
+              <a:t>26</a:t>
             </a:fld>
             <a:endParaRPr lang="en-US" dirty="0"/>
           </a:p>
@@ -15200,109 +15397,6 @@
     <p:extLst>
       <p:ext uri="{BB962C8B-B14F-4D97-AF65-F5344CB8AC3E}">
         <p14:creationId xmlns:p14="http://schemas.microsoft.com/office/powerpoint/2010/main" val="2968833177"/>
-      </p:ext>
-    </p:extLst>
-  </p:cSld>
-  <p:clrMapOvr>
-    <a:masterClrMapping/>
-  </p:clrMapOvr>
-  <p:timing>
-    <p:tnLst>
-      <p:par>
-        <p:cTn id="1" dur="indefinite" restart="never" nodeType="tmRoot"/>
-      </p:par>
-    </p:tnLst>
-  </p:timing>
-</p:sld>
-</file>
-
-<file path=ppt/slides/slide26.xml><?xml version="1.0" encoding="utf-8"?>
-<p:sld xmlns:a="http://schemas.openxmlformats.org/drawingml/2006/main" xmlns:r="http://schemas.openxmlformats.org/officeDocument/2006/relationships" xmlns:p="http://schemas.openxmlformats.org/presentationml/2006/main">
-  <p:cSld>
-    <p:spTree>
-      <p:nvGrpSpPr>
-        <p:cNvPr id="1" name=""/>
-        <p:cNvGrpSpPr/>
-        <p:nvPr/>
-      </p:nvGrpSpPr>
-      <p:grpSpPr>
-        <a:xfrm>
-          <a:off x="0" y="0"/>
-          <a:ext cx="0" cy="0"/>
-          <a:chOff x="0" y="0"/>
-          <a:chExt cx="0" cy="0"/>
-        </a:xfrm>
-      </p:grpSpPr>
-      <p:sp>
-        <p:nvSpPr>
-          <p:cNvPr id="2" name="Title 1"/>
-          <p:cNvSpPr>
-            <a:spLocks noGrp="1"/>
-          </p:cNvSpPr>
-          <p:nvPr>
-            <p:ph type="title"/>
-          </p:nvPr>
-        </p:nvSpPr>
-        <p:spPr/>
-        <p:txBody>
-          <a:bodyPr/>
-          <a:lstStyle/>
-          <a:p>
-            <a:r>
-              <a:rPr lang="en-US" dirty="0" smtClean="0"/>
-              <a:t>Experimentation</a:t>
-            </a:r>
-            <a:endParaRPr lang="en-US" dirty="0"/>
-          </a:p>
-        </p:txBody>
-      </p:sp>
-      <p:sp>
-        <p:nvSpPr>
-          <p:cNvPr id="3" name="Text Placeholder 2"/>
-          <p:cNvSpPr>
-            <a:spLocks noGrp="1"/>
-          </p:cNvSpPr>
-          <p:nvPr>
-            <p:ph type="body" idx="1"/>
-          </p:nvPr>
-        </p:nvSpPr>
-        <p:spPr/>
-        <p:txBody>
-          <a:bodyPr/>
-          <a:lstStyle/>
-          <a:p>
-            <a:endParaRPr lang="en-US"/>
-          </a:p>
-        </p:txBody>
-      </p:sp>
-      <p:sp>
-        <p:nvSpPr>
-          <p:cNvPr id="4" name="Slide Number Placeholder 3"/>
-          <p:cNvSpPr>
-            <a:spLocks noGrp="1"/>
-          </p:cNvSpPr>
-          <p:nvPr>
-            <p:ph type="sldNum" sz="quarter" idx="12"/>
-          </p:nvPr>
-        </p:nvSpPr>
-        <p:spPr/>
-        <p:txBody>
-          <a:bodyPr/>
-          <a:lstStyle/>
-          <a:p>
-            <a:fld id="{CF142645-850A-43A6-BF6E-75FA772F8DCF}" type="slidenum">
-              <a:rPr lang="en-US" smtClean="0"/>
-              <a:pPr/>
-              <a:t>26</a:t>
-            </a:fld>
-            <a:endParaRPr lang="en-US" dirty="0"/>
-          </a:p>
-        </p:txBody>
-      </p:sp>
-    </p:spTree>
-    <p:extLst>
-      <p:ext uri="{BB962C8B-B14F-4D97-AF65-F5344CB8AC3E}">
-        <p14:creationId xmlns:p14="http://schemas.microsoft.com/office/powerpoint/2010/main" val="1417056284"/>
       </p:ext>
     </p:extLst>
   </p:cSld>
@@ -15348,14 +15442,35 @@
         </p:nvSpPr>
         <p:spPr/>
         <p:txBody>
+          <a:bodyPr>
+            <a:normAutofit/>
+          </a:bodyPr>
+          <a:lstStyle/>
+          <a:p>
+            <a:r>
+              <a:rPr lang="en-US" sz="3800" dirty="0" smtClean="0"/>
+              <a:t>Experimentation and evaluation</a:t>
+            </a:r>
+            <a:endParaRPr lang="en-US" sz="3800" dirty="0"/>
+          </a:p>
+        </p:txBody>
+      </p:sp>
+      <p:sp>
+        <p:nvSpPr>
+          <p:cNvPr id="3" name="Text Placeholder 2"/>
+          <p:cNvSpPr>
+            <a:spLocks noGrp="1"/>
+          </p:cNvSpPr>
+          <p:nvPr>
+            <p:ph type="body" idx="1"/>
+          </p:nvPr>
+        </p:nvSpPr>
+        <p:spPr/>
+        <p:txBody>
           <a:bodyPr/>
           <a:lstStyle/>
           <a:p>
-            <a:r>
-              <a:rPr lang="en-US" dirty="0" smtClean="0"/>
-              <a:t>Simulator Modifications</a:t>
-            </a:r>
-            <a:endParaRPr lang="en-US" dirty="0"/>
+            <a:endParaRPr lang="en-US"/>
           </a:p>
         </p:txBody>
       </p:sp>
@@ -15378,6 +15493,90 @@
               <a:rPr lang="en-US" smtClean="0"/>
               <a:pPr/>
               <a:t>27</a:t>
+            </a:fld>
+            <a:endParaRPr lang="en-US" dirty="0"/>
+          </a:p>
+        </p:txBody>
+      </p:sp>
+    </p:spTree>
+    <p:extLst>
+      <p:ext uri="{BB962C8B-B14F-4D97-AF65-F5344CB8AC3E}">
+        <p14:creationId xmlns:p14="http://schemas.microsoft.com/office/powerpoint/2010/main" val="1417056284"/>
+      </p:ext>
+    </p:extLst>
+  </p:cSld>
+  <p:clrMapOvr>
+    <a:masterClrMapping/>
+  </p:clrMapOvr>
+  <p:timing>
+    <p:tnLst>
+      <p:par>
+        <p:cTn id="1" dur="indefinite" restart="never" nodeType="tmRoot"/>
+      </p:par>
+    </p:tnLst>
+  </p:timing>
+</p:sld>
+</file>
+
+<file path=ppt/slides/slide28.xml><?xml version="1.0" encoding="utf-8"?>
+<p:sld xmlns:a="http://schemas.openxmlformats.org/drawingml/2006/main" xmlns:r="http://schemas.openxmlformats.org/officeDocument/2006/relationships" xmlns:p="http://schemas.openxmlformats.org/presentationml/2006/main">
+  <p:cSld>
+    <p:spTree>
+      <p:nvGrpSpPr>
+        <p:cNvPr id="1" name=""/>
+        <p:cNvGrpSpPr/>
+        <p:nvPr/>
+      </p:nvGrpSpPr>
+      <p:grpSpPr>
+        <a:xfrm>
+          <a:off x="0" y="0"/>
+          <a:ext cx="0" cy="0"/>
+          <a:chOff x="0" y="0"/>
+          <a:chExt cx="0" cy="0"/>
+        </a:xfrm>
+      </p:grpSpPr>
+      <p:sp>
+        <p:nvSpPr>
+          <p:cNvPr id="2" name="Title 1"/>
+          <p:cNvSpPr>
+            <a:spLocks noGrp="1"/>
+          </p:cNvSpPr>
+          <p:nvPr>
+            <p:ph type="title"/>
+          </p:nvPr>
+        </p:nvSpPr>
+        <p:spPr/>
+        <p:txBody>
+          <a:bodyPr/>
+          <a:lstStyle/>
+          <a:p>
+            <a:r>
+              <a:rPr lang="en-US" dirty="0" smtClean="0"/>
+              <a:t>Simulator Modifications</a:t>
+            </a:r>
+            <a:endParaRPr lang="en-US" dirty="0"/>
+          </a:p>
+        </p:txBody>
+      </p:sp>
+      <p:sp>
+        <p:nvSpPr>
+          <p:cNvPr id="4" name="Slide Number Placeholder 3"/>
+          <p:cNvSpPr>
+            <a:spLocks noGrp="1"/>
+          </p:cNvSpPr>
+          <p:nvPr>
+            <p:ph type="sldNum" sz="quarter" idx="12"/>
+          </p:nvPr>
+        </p:nvSpPr>
+        <p:spPr/>
+        <p:txBody>
+          <a:bodyPr/>
+          <a:lstStyle/>
+          <a:p>
+            <a:fld id="{CF142645-850A-43A6-BF6E-75FA772F8DCF}" type="slidenum">
+              <a:rPr lang="en-US" smtClean="0"/>
+              <a:pPr/>
+              <a:t>28</a:t>
             </a:fld>
             <a:endParaRPr lang="en-US" dirty="0"/>
           </a:p>
@@ -16555,131 +16754,6 @@
 </p:sld>
 </file>
 
-<file path=ppt/slides/slide28.xml><?xml version="1.0" encoding="utf-8"?>
-<p:sld xmlns:a="http://schemas.openxmlformats.org/drawingml/2006/main" xmlns:r="http://schemas.openxmlformats.org/officeDocument/2006/relationships" xmlns:p="http://schemas.openxmlformats.org/presentationml/2006/main">
-  <p:cSld>
-    <p:spTree>
-      <p:nvGrpSpPr>
-        <p:cNvPr id="1" name=""/>
-        <p:cNvGrpSpPr/>
-        <p:nvPr/>
-      </p:nvGrpSpPr>
-      <p:grpSpPr>
-        <a:xfrm>
-          <a:off x="0" y="0"/>
-          <a:ext cx="0" cy="0"/>
-          <a:chOff x="0" y="0"/>
-          <a:chExt cx="0" cy="0"/>
-        </a:xfrm>
-      </p:grpSpPr>
-      <p:sp>
-        <p:nvSpPr>
-          <p:cNvPr id="2" name="Title 1"/>
-          <p:cNvSpPr>
-            <a:spLocks noGrp="1"/>
-          </p:cNvSpPr>
-          <p:nvPr>
-            <p:ph type="title"/>
-          </p:nvPr>
-        </p:nvSpPr>
-        <p:spPr/>
-        <p:txBody>
-          <a:bodyPr/>
-          <a:lstStyle/>
-          <a:p>
-            <a:r>
-              <a:rPr lang="en-US" dirty="0" smtClean="0"/>
-              <a:t>Simulation Settings</a:t>
-            </a:r>
-            <a:endParaRPr lang="en-US" dirty="0"/>
-          </a:p>
-        </p:txBody>
-      </p:sp>
-      <p:sp>
-        <p:nvSpPr>
-          <p:cNvPr id="3" name="Content Placeholder 2"/>
-          <p:cNvSpPr>
-            <a:spLocks noGrp="1"/>
-          </p:cNvSpPr>
-          <p:nvPr>
-            <p:ph idx="1"/>
-          </p:nvPr>
-        </p:nvSpPr>
-        <p:spPr/>
-        <p:txBody>
-          <a:bodyPr/>
-          <a:lstStyle/>
-          <a:p>
-            <a:r>
-              <a:rPr lang="en-US" dirty="0" smtClean="0"/>
-              <a:t>Nodes are placed randomly in an area of 500m×500m</a:t>
-            </a:r>
-          </a:p>
-          <a:p>
-            <a:r>
-              <a:rPr lang="en-US" dirty="0" smtClean="0"/>
-              <a:t>Application data rate is varied from 1 Mbps to 32 Mbps</a:t>
-            </a:r>
-          </a:p>
-          <a:p>
-            <a:r>
-              <a:rPr lang="en-US" dirty="0" smtClean="0"/>
-              <a:t>The number of secondary users is varied from 12 to 40 with a granularity of 4</a:t>
-            </a:r>
-          </a:p>
-          <a:p>
-            <a:r>
-              <a:rPr lang="en-US" dirty="0" smtClean="0"/>
-              <a:t>For each such settings, we perform 99 simulation iterations, each of 50 seconds</a:t>
-            </a:r>
-            <a:endParaRPr lang="en-US" dirty="0"/>
-          </a:p>
-        </p:txBody>
-      </p:sp>
-      <p:sp>
-        <p:nvSpPr>
-          <p:cNvPr id="4" name="Slide Number Placeholder 3"/>
-          <p:cNvSpPr>
-            <a:spLocks noGrp="1"/>
-          </p:cNvSpPr>
-          <p:nvPr>
-            <p:ph type="sldNum" sz="quarter" idx="12"/>
-          </p:nvPr>
-        </p:nvSpPr>
-        <p:spPr/>
-        <p:txBody>
-          <a:bodyPr/>
-          <a:lstStyle/>
-          <a:p>
-            <a:fld id="{CF142645-850A-43A6-BF6E-75FA772F8DCF}" type="slidenum">
-              <a:rPr lang="en-US" smtClean="0"/>
-              <a:pPr/>
-              <a:t>28</a:t>
-            </a:fld>
-            <a:endParaRPr lang="en-US" dirty="0"/>
-          </a:p>
-        </p:txBody>
-      </p:sp>
-    </p:spTree>
-    <p:extLst>
-      <p:ext uri="{BB962C8B-B14F-4D97-AF65-F5344CB8AC3E}">
-        <p14:creationId xmlns:p14="http://schemas.microsoft.com/office/powerpoint/2010/main" val="860338447"/>
-      </p:ext>
-    </p:extLst>
-  </p:cSld>
-  <p:clrMapOvr>
-    <a:masterClrMapping/>
-  </p:clrMapOvr>
-  <p:timing>
-    <p:tnLst>
-      <p:par>
-        <p:cTn id="1" dur="indefinite" restart="never" nodeType="tmRoot"/>
-      </p:par>
-    </p:tnLst>
-  </p:timing>
-</p:sld>
-</file>
-
 <file path=ppt/slides/slide29.xml><?xml version="1.0" encoding="utf-8"?>
 <p:sld xmlns:a="http://schemas.openxmlformats.org/drawingml/2006/main" xmlns:r="http://schemas.openxmlformats.org/officeDocument/2006/relationships" xmlns:p="http://schemas.openxmlformats.org/presentationml/2006/main">
   <p:cSld>
@@ -16714,28 +16788,9 @@
           <a:p>
             <a:r>
               <a:rPr lang="en-US" dirty="0" smtClean="0"/>
-              <a:t>Evaluation</a:t>
+              <a:t>Simulation Settings</a:t>
             </a:r>
             <a:endParaRPr lang="en-US" dirty="0"/>
-          </a:p>
-        </p:txBody>
-      </p:sp>
-      <p:sp>
-        <p:nvSpPr>
-          <p:cNvPr id="3" name="Text Placeholder 2"/>
-          <p:cNvSpPr>
-            <a:spLocks noGrp="1"/>
-          </p:cNvSpPr>
-          <p:nvPr>
-            <p:ph type="body" idx="1"/>
-          </p:nvPr>
-        </p:nvSpPr>
-        <p:spPr/>
-        <p:txBody>
-          <a:bodyPr/>
-          <a:lstStyle/>
-          <a:p>
-            <a:endParaRPr lang="en-US"/>
           </a:p>
         </p:txBody>
       </p:sp>
@@ -16763,10 +16818,391 @@
           </a:p>
         </p:txBody>
       </p:sp>
+      <p:graphicFrame>
+        <p:nvGraphicFramePr>
+          <p:cNvPr id="6" name="Content Placeholder 5"/>
+          <p:cNvGraphicFramePr>
+            <a:graphicFrameLocks noGrp="1"/>
+          </p:cNvGraphicFramePr>
+          <p:nvPr>
+            <p:ph idx="1"/>
+            <p:extLst>
+              <p:ext uri="{D42A27DB-BD31-4B8C-83A1-F6EECF244321}">
+                <p14:modId xmlns:p14="http://schemas.microsoft.com/office/powerpoint/2010/main" val="4127180747"/>
+              </p:ext>
+            </p:extLst>
+          </p:nvPr>
+        </p:nvGraphicFramePr>
+        <p:xfrm>
+          <a:off x="457200" y="1600200"/>
+          <a:ext cx="8229600" cy="4079240"/>
+        </p:xfrm>
+        <a:graphic>
+          <a:graphicData uri="http://schemas.openxmlformats.org/drawingml/2006/table">
+            <a:tbl>
+              <a:tblPr firstRow="1" bandRow="1">
+                <a:tableStyleId>{5C22544A-7EE6-4342-B048-85BDC9FD1C3A}</a:tableStyleId>
+              </a:tblPr>
+              <a:tblGrid>
+                <a:gridCol w="4114800"/>
+                <a:gridCol w="4114800"/>
+              </a:tblGrid>
+              <a:tr h="370840">
+                <a:tc>
+                  <a:txBody>
+                    <a:bodyPr/>
+                    <a:lstStyle/>
+                    <a:p>
+                      <a:pPr algn="ctr"/>
+                      <a:r>
+                        <a:rPr lang="en-US" dirty="0" smtClean="0"/>
+                        <a:t>Parameter</a:t>
+                      </a:r>
+                      <a:endParaRPr lang="en-US" dirty="0"/>
+                    </a:p>
+                  </a:txBody>
+                  <a:tcPr/>
+                </a:tc>
+                <a:tc>
+                  <a:txBody>
+                    <a:bodyPr/>
+                    <a:lstStyle/>
+                    <a:p>
+                      <a:pPr algn="ctr"/>
+                      <a:r>
+                        <a:rPr lang="en-US" dirty="0" smtClean="0"/>
+                        <a:t>Value</a:t>
+                      </a:r>
+                      <a:endParaRPr lang="en-US" dirty="0"/>
+                    </a:p>
+                  </a:txBody>
+                  <a:tcPr/>
+                </a:tc>
+              </a:tr>
+              <a:tr h="370840">
+                <a:tc>
+                  <a:txBody>
+                    <a:bodyPr/>
+                    <a:lstStyle/>
+                    <a:p>
+                      <a:r>
+                        <a:rPr lang="en-US" dirty="0" smtClean="0"/>
+                        <a:t>Area</a:t>
+                      </a:r>
+                      <a:endParaRPr lang="en-US" dirty="0"/>
+                    </a:p>
+                  </a:txBody>
+                  <a:tcPr/>
+                </a:tc>
+                <a:tc>
+                  <a:txBody>
+                    <a:bodyPr/>
+                    <a:lstStyle/>
+                    <a:p>
+                      <a:r>
+                        <a:rPr lang="en-US" dirty="0" smtClean="0"/>
+                        <a:t>500m×500m</a:t>
+                      </a:r>
+                      <a:endParaRPr lang="en-US" dirty="0"/>
+                    </a:p>
+                  </a:txBody>
+                  <a:tcPr/>
+                </a:tc>
+              </a:tr>
+              <a:tr h="370840">
+                <a:tc>
+                  <a:txBody>
+                    <a:bodyPr/>
+                    <a:lstStyle/>
+                    <a:p>
+                      <a:r>
+                        <a:rPr lang="en-US" dirty="0" smtClean="0"/>
+                        <a:t>Application data transmission rate</a:t>
+                      </a:r>
+                      <a:endParaRPr lang="en-US" dirty="0"/>
+                    </a:p>
+                  </a:txBody>
+                  <a:tcPr/>
+                </a:tc>
+                <a:tc>
+                  <a:txBody>
+                    <a:bodyPr/>
+                    <a:lstStyle/>
+                    <a:p>
+                      <a:r>
+                        <a:rPr lang="en-US" dirty="0" smtClean="0"/>
+                        <a:t>1 Mbps – 32 Mbps</a:t>
+                      </a:r>
+                      <a:endParaRPr lang="en-US" dirty="0"/>
+                    </a:p>
+                  </a:txBody>
+                  <a:tcPr/>
+                </a:tc>
+              </a:tr>
+              <a:tr h="370840">
+                <a:tc>
+                  <a:txBody>
+                    <a:bodyPr/>
+                    <a:lstStyle/>
+                    <a:p>
+                      <a:r>
+                        <a:rPr lang="en-US" dirty="0" smtClean="0"/>
+                        <a:t>Channel code rate</a:t>
+                      </a:r>
+                      <a:endParaRPr lang="en-US" dirty="0"/>
+                    </a:p>
+                  </a:txBody>
+                  <a:tcPr/>
+                </a:tc>
+                <a:tc>
+                  <a:txBody>
+                    <a:bodyPr/>
+                    <a:lstStyle/>
+                    <a:p>
+                      <a:r>
+                        <a:rPr lang="en-US" dirty="0" smtClean="0"/>
+                        <a:t>OFDM 18</a:t>
+                      </a:r>
+                      <a:r>
+                        <a:rPr lang="en-US" baseline="0" dirty="0" smtClean="0"/>
+                        <a:t> Mbps</a:t>
+                      </a:r>
+                      <a:endParaRPr lang="en-US" dirty="0"/>
+                    </a:p>
+                  </a:txBody>
+                  <a:tcPr/>
+                </a:tc>
+              </a:tr>
+              <a:tr h="370840">
+                <a:tc>
+                  <a:txBody>
+                    <a:bodyPr/>
+                    <a:lstStyle/>
+                    <a:p>
+                      <a:r>
+                        <a:rPr lang="en-US" dirty="0" smtClean="0"/>
+                        <a:t>Number of channels</a:t>
+                      </a:r>
+                      <a:endParaRPr lang="en-US" dirty="0"/>
+                    </a:p>
+                  </a:txBody>
+                  <a:tcPr/>
+                </a:tc>
+                <a:tc>
+                  <a:txBody>
+                    <a:bodyPr/>
+                    <a:lstStyle/>
+                    <a:p>
+                      <a:r>
+                        <a:rPr lang="en-US" dirty="0" smtClean="0"/>
+                        <a:t>11</a:t>
+                      </a:r>
+                      <a:endParaRPr lang="en-US" dirty="0"/>
+                    </a:p>
+                  </a:txBody>
+                  <a:tcPr/>
+                </a:tc>
+              </a:tr>
+              <a:tr h="370840">
+                <a:tc>
+                  <a:txBody>
+                    <a:bodyPr/>
+                    <a:lstStyle/>
+                    <a:p>
+                      <a:r>
+                        <a:rPr lang="en-US" dirty="0" smtClean="0"/>
+                        <a:t>Number of primary users</a:t>
+                      </a:r>
+                      <a:endParaRPr lang="en-US" dirty="0"/>
+                    </a:p>
+                  </a:txBody>
+                  <a:tcPr/>
+                </a:tc>
+                <a:tc>
+                  <a:txBody>
+                    <a:bodyPr/>
+                    <a:lstStyle/>
+                    <a:p>
+                      <a:r>
+                        <a:rPr lang="en-US" dirty="0" smtClean="0"/>
+                        <a:t>11</a:t>
+                      </a:r>
+                      <a:endParaRPr lang="en-US" dirty="0"/>
+                    </a:p>
+                  </a:txBody>
+                  <a:tcPr/>
+                </a:tc>
+              </a:tr>
+              <a:tr h="370840">
+                <a:tc>
+                  <a:txBody>
+                    <a:bodyPr/>
+                    <a:lstStyle/>
+                    <a:p>
+                      <a:r>
+                        <a:rPr lang="en-US" dirty="0" smtClean="0"/>
+                        <a:t>Number of secondary users</a:t>
+                      </a:r>
+                      <a:endParaRPr lang="en-US" dirty="0"/>
+                    </a:p>
+                  </a:txBody>
+                  <a:tcPr/>
+                </a:tc>
+                <a:tc>
+                  <a:txBody>
+                    <a:bodyPr/>
+                    <a:lstStyle/>
+                    <a:p>
+                      <a:r>
+                        <a:rPr lang="en-US" dirty="0" smtClean="0"/>
+                        <a:t>12 – 40 with a</a:t>
+                      </a:r>
+                      <a:r>
+                        <a:rPr lang="en-US" baseline="0" dirty="0" smtClean="0"/>
+                        <a:t> granularity of 4</a:t>
+                      </a:r>
+                      <a:endParaRPr lang="en-US" dirty="0"/>
+                    </a:p>
+                  </a:txBody>
+                  <a:tcPr/>
+                </a:tc>
+              </a:tr>
+              <a:tr h="370840">
+                <a:tc>
+                  <a:txBody>
+                    <a:bodyPr/>
+                    <a:lstStyle/>
+                    <a:p>
+                      <a:r>
+                        <a:rPr lang="en-US" dirty="0" smtClean="0"/>
+                        <a:t>Radio transmission</a:t>
+                      </a:r>
+                      <a:r>
+                        <a:rPr lang="en-US" baseline="0" dirty="0" smtClean="0"/>
+                        <a:t> range</a:t>
+                      </a:r>
+                      <a:endParaRPr lang="en-US" dirty="0"/>
+                    </a:p>
+                  </a:txBody>
+                  <a:tcPr/>
+                </a:tc>
+                <a:tc>
+                  <a:txBody>
+                    <a:bodyPr/>
+                    <a:lstStyle/>
+                    <a:p>
+                      <a:r>
+                        <a:rPr lang="en-US" dirty="0" smtClean="0"/>
+                        <a:t>130 m</a:t>
+                      </a:r>
+                      <a:endParaRPr lang="en-US" dirty="0"/>
+                    </a:p>
+                  </a:txBody>
+                  <a:tcPr/>
+                </a:tc>
+              </a:tr>
+              <a:tr h="370840">
+                <a:tc>
+                  <a:txBody>
+                    <a:bodyPr/>
+                    <a:lstStyle/>
+                    <a:p>
+                      <a:r>
+                        <a:rPr lang="en-US" dirty="0" smtClean="0"/>
+                        <a:t>Radio sensing range</a:t>
+                      </a:r>
+                      <a:endParaRPr lang="en-US" dirty="0"/>
+                    </a:p>
+                  </a:txBody>
+                  <a:tcPr/>
+                </a:tc>
+                <a:tc>
+                  <a:txBody>
+                    <a:bodyPr/>
+                    <a:lstStyle/>
+                    <a:p>
+                      <a:r>
+                        <a:rPr lang="en-US" dirty="0" smtClean="0"/>
+                        <a:t>250 m</a:t>
+                      </a:r>
+                      <a:endParaRPr lang="en-US" dirty="0"/>
+                    </a:p>
+                  </a:txBody>
+                  <a:tcPr/>
+                </a:tc>
+              </a:tr>
+              <a:tr h="370840">
+                <a:tc>
+                  <a:txBody>
+                    <a:bodyPr/>
+                    <a:lstStyle/>
+                    <a:p>
+                      <a:r>
+                        <a:rPr lang="en-US" dirty="0" smtClean="0"/>
+                        <a:t>Simulation time</a:t>
+                      </a:r>
+                      <a:endParaRPr lang="en-US" dirty="0"/>
+                    </a:p>
+                  </a:txBody>
+                  <a:tcPr/>
+                </a:tc>
+                <a:tc>
+                  <a:txBody>
+                    <a:bodyPr/>
+                    <a:lstStyle/>
+                    <a:p>
+                      <a:r>
+                        <a:rPr lang="en-US" dirty="0" smtClean="0"/>
+                        <a:t>50</a:t>
+                      </a:r>
+                      <a:r>
+                        <a:rPr lang="en-US" baseline="0" dirty="0" smtClean="0"/>
+                        <a:t> seconds</a:t>
+                      </a:r>
+                      <a:endParaRPr lang="en-US" dirty="0"/>
+                    </a:p>
+                  </a:txBody>
+                  <a:tcPr/>
+                </a:tc>
+              </a:tr>
+              <a:tr h="370840">
+                <a:tc>
+                  <a:txBody>
+                    <a:bodyPr/>
+                    <a:lstStyle/>
+                    <a:p>
+                      <a:r>
+                        <a:rPr lang="en-US" dirty="0" smtClean="0"/>
+                        <a:t>Iteration count</a:t>
+                      </a:r>
+                      <a:endParaRPr lang="en-US" dirty="0"/>
+                    </a:p>
+                  </a:txBody>
+                  <a:tcPr/>
+                </a:tc>
+                <a:tc>
+                  <a:txBody>
+                    <a:bodyPr/>
+                    <a:lstStyle/>
+                    <a:p>
+                      <a:r>
+                        <a:rPr lang="en-US" dirty="0" smtClean="0"/>
+                        <a:t>99</a:t>
+                      </a:r>
+                      <a:endParaRPr lang="en-US" dirty="0"/>
+                    </a:p>
+                  </a:txBody>
+                  <a:tcPr/>
+                </a:tc>
+              </a:tr>
+            </a:tbl>
+          </a:graphicData>
+        </a:graphic>
+      </p:graphicFrame>
     </p:spTree>
     <p:extLst>
       <p:ext uri="{BB962C8B-B14F-4D97-AF65-F5344CB8AC3E}">
-        <p14:creationId xmlns:p14="http://schemas.microsoft.com/office/powerpoint/2010/main" val="2495303577"/>
+        <p14:creationId xmlns:p14="http://schemas.microsoft.com/office/powerpoint/2010/main" val="860338447"/>
       </p:ext>
     </p:extLst>
   </p:cSld>
@@ -18401,15 +18837,7 @@
             <a:pPr algn="ctr"/>
             <a:r>
               <a:rPr lang="en-US" sz="3200" dirty="0" smtClean="0"/>
-              <a:t>Delay</a:t>
-            </a:r>
-            <a:r>
-              <a:rPr lang="en-US" sz="3200" dirty="0" smtClean="0"/>
-              <a:t> </a:t>
-            </a:r>
-            <a:r>
-              <a:rPr lang="en-US" sz="3200" dirty="0" smtClean="0"/>
-              <a:t>with Different Data Rates</a:t>
+              <a:t>Delay with Different Data Rates</a:t>
             </a:r>
             <a:endParaRPr lang="en-US" sz="3200" dirty="0"/>
           </a:p>
@@ -18992,14 +19420,7 @@
                           <a:latin typeface="+mj-lt"/>
                           <a:cs typeface="Times New Roman" panose="02020603050405020304" pitchFamily="18" charset="0"/>
                         </a:rPr>
-                        <a:t> of improvement in </a:t>
-                      </a:r>
-                      <a:r>
-                        <a:rPr lang="en-US" sz="2400" baseline="0" dirty="0" smtClean="0">
-                          <a:latin typeface="+mj-lt"/>
-                          <a:cs typeface="Times New Roman" panose="02020603050405020304" pitchFamily="18" charset="0"/>
-                        </a:rPr>
-                        <a:t>performance</a:t>
+                        <a:t> of improvement in performance</a:t>
                       </a:r>
                       <a:endParaRPr lang="en-US" sz="2400" dirty="0">
                         <a:latin typeface="+mj-lt"/>
@@ -19435,14 +19856,7 @@
                           <a:latin typeface="+mj-lt"/>
                           <a:cs typeface="Times New Roman" panose="02020603050405020304" pitchFamily="18" charset="0"/>
                         </a:rPr>
-                        <a:t>Packet drop ratio </a:t>
-                      </a:r>
-                      <a:r>
-                        <a:rPr lang="en-US" sz="1600" dirty="0" smtClean="0">
-                          <a:latin typeface="+mj-lt"/>
-                          <a:cs typeface="Times New Roman" panose="02020603050405020304" pitchFamily="18" charset="0"/>
-                        </a:rPr>
-                        <a:t>w.r.t.</a:t>
+                        <a:t>Packet drop ratio w.r.t.</a:t>
                       </a:r>
                       <a:endParaRPr lang="en-US" sz="1600" dirty="0">
                         <a:latin typeface="+mj-lt"/>
@@ -19546,14 +19960,7 @@
                           <a:latin typeface="+mj-lt"/>
                           <a:cs typeface="Times New Roman" panose="02020603050405020304" pitchFamily="18" charset="0"/>
                         </a:rPr>
-                        <a:t>w.r.t</a:t>
-                      </a:r>
-                      <a:r>
-                        <a:rPr lang="en-US" sz="1600" dirty="0" smtClean="0">
-                          <a:latin typeface="+mj-lt"/>
-                          <a:cs typeface="Times New Roman" panose="02020603050405020304" pitchFamily="18" charset="0"/>
-                        </a:rPr>
-                        <a:t>.</a:t>
+                        <a:t>w.r.t.</a:t>
                       </a:r>
                       <a:endParaRPr lang="en-US" sz="1600" dirty="0">
                         <a:latin typeface="+mj-lt"/>
@@ -24803,13 +25210,8 @@
           <a:p>
             <a:r>
               <a:rPr lang="en-US" dirty="0" smtClean="0"/>
-              <a:t>We compare the performance of our proposed approach with that of other contemporary </a:t>
-            </a:r>
-            <a:r>
-              <a:rPr lang="en-US" dirty="0" smtClean="0"/>
-              <a:t>approaches</a:t>
-            </a:r>
-            <a:endParaRPr lang="en-US" dirty="0" smtClean="0"/>
+              <a:t>We compare the performance of our proposed approach with that of other contemporary approaches</a:t>
+            </a:r>
           </a:p>
           <a:p>
             <a:pPr lvl="1"/>
@@ -24835,7 +25237,6 @@
               <a:rPr lang="en-US" dirty="0" smtClean="0"/>
               <a:t>Our approach reduces packet drop ratio by 35%</a:t>
             </a:r>
-            <a:endParaRPr lang="en-US" dirty="0" smtClean="0"/>
           </a:p>
           <a:p>
             <a:endParaRPr lang="en-US" dirty="0"/>
@@ -26586,7 +26987,7 @@
           <p:nvPr/>
         </p:nvPicPr>
         <p:blipFill>
-          <a:blip r:embed="rId2" cstate="print"/>
+          <a:blip r:embed="rId3" cstate="print"/>
           <a:stretch>
             <a:fillRect/>
           </a:stretch>

</xml_diff>

<commit_message>
95% confidence interval is calculated and added.
</commit_message>
<xml_diff>
--- a/draft.pptx
+++ b/draft.pptx
@@ -824,11 +824,7 @@
           <a:p>
             <a:r>
               <a:rPr lang="en-US" baseline="0" dirty="0" smtClean="0"/>
-              <a:t>Since </a:t>
-            </a:r>
-            <a:r>
-              <a:rPr lang="en-US" baseline="0" dirty="0" smtClean="0"/>
-              <a:t>2014 the mobile spectrum demand has surpassed the capacity of wireless spectrum. So, there is a Spectrum scarcity problem.</a:t>
+              <a:t>Since 2014 the mobile spectrum demand has surpassed the capacity of wireless spectrum. So, there is a Spectrum scarcity problem.</a:t>
             </a:r>
             <a:endParaRPr lang="en-US" dirty="0"/>
           </a:p>
@@ -15155,8 +15151,8 @@
           </a:p>
         </p:txBody>
       </p:sp>
-      <mc:AlternateContent xmlns:mc="http://schemas.openxmlformats.org/markup-compatibility/2006">
-        <mc:Choice xmlns:a14="http://schemas.microsoft.com/office/drawing/2010/main" Requires="a14">
+      <mc:AlternateContent xmlns:mc="http://schemas.openxmlformats.org/markup-compatibility/2006" xmlns:a14="http://schemas.microsoft.com/office/drawing/2010/main">
+        <mc:Choice Requires="a14">
           <p:sp>
             <p:nvSpPr>
               <p:cNvPr id="13" name="TextBox 12"/>
@@ -15513,7 +15509,7 @@
             </p:txBody>
           </p:sp>
         </mc:Choice>
-        <mc:Fallback>
+        <mc:Fallback xmlns="">
           <p:sp>
             <p:nvSpPr>
               <p:cNvPr id="13" name="TextBox 12"/>
@@ -20950,11 +20946,7 @@
                       <a:pPr algn="l"/>
                       <a:r>
                         <a:rPr lang="en-US" sz="2000" dirty="0" smtClean="0"/>
-                        <a:t>Un-weighted </a:t>
-                      </a:r>
-                      <a:r>
-                        <a:rPr lang="en-US" sz="2000" dirty="0" smtClean="0"/>
-                        <a:t>lottery</a:t>
+                        <a:t>Un-weighted lottery</a:t>
                       </a:r>
                       <a:endParaRPr lang="en-US" sz="2000" dirty="0"/>
                     </a:p>
@@ -20986,11 +20978,7 @@
                       <a:pPr algn="l"/>
                       <a:r>
                         <a:rPr lang="en-US" sz="2000" dirty="0" smtClean="0"/>
-                        <a:t>Un-weighted </a:t>
-                      </a:r>
-                      <a:r>
-                        <a:rPr lang="en-US" sz="2000" dirty="0" smtClean="0"/>
-                        <a:t>lottery</a:t>
+                        <a:t>Un-weighted lottery</a:t>
                       </a:r>
                       <a:endParaRPr lang="en-US" sz="2000" dirty="0"/>
                     </a:p>
@@ -22523,7 +22511,7 @@
             <p:ph idx="1"/>
             <p:extLst>
               <p:ext uri="{D42A27DB-BD31-4B8C-83A1-F6EECF244321}">
-                <p14:modId xmlns:p14="http://schemas.microsoft.com/office/powerpoint/2010/main" val="4127180747"/>
+                <p14:modId xmlns:p14="http://schemas.microsoft.com/office/powerpoint/2010/main" val="2537177914"/>
               </p:ext>
             </p:extLst>
           </p:nvPr>
@@ -22539,8 +22527,8 @@
                 <a:tableStyleId>{5C22544A-7EE6-4342-B048-85BDC9FD1C3A}</a:tableStyleId>
               </a:tblPr>
               <a:tblGrid>
-                <a:gridCol w="4114800"/>
-                <a:gridCol w="4114800"/>
+                <a:gridCol w="3657600"/>
+                <a:gridCol w="4572000"/>
               </a:tblGrid>
               <a:tr h="370840">
                 <a:tc>
@@ -22892,15 +22880,11 @@
                       <a:pPr algn="ctr"/>
                       <a:r>
                         <a:rPr lang="en-US" dirty="0" smtClean="0"/>
-                        <a:t>99 </a:t>
+                        <a:t>99 (95% confidence</a:t>
                       </a:r>
                       <a:r>
-                        <a:rPr lang="en-US" dirty="0" smtClean="0">
-                          <a:solidFill>
-                            <a:srgbClr val="FF0000"/>
-                          </a:solidFill>
-                        </a:rPr>
-                        <a:t>(confidence interval is …..)</a:t>
+                        <a:rPr lang="en-US" baseline="0" dirty="0" smtClean="0"/>
+                        <a:t> interval is less than 0.001)</a:t>
                       </a:r>
                       <a:endParaRPr lang="en-US" dirty="0">
                         <a:solidFill>

</xml_diff>